<commit_message>
lesson explore3d add example film
</commit_message>
<xml_diff>
--- a/課程資料/3D空間大探索/02轉動地球.pptx
+++ b/課程資料/3D空間大探索/02轉動地球.pptx
@@ -9,21 +9,25 @@
     <p:sldId id="262" r:id="rId3"/>
     <p:sldId id="267" r:id="rId4"/>
     <p:sldId id="278" r:id="rId5"/>
-    <p:sldId id="332" r:id="rId6"/>
-    <p:sldId id="333" r:id="rId7"/>
-    <p:sldId id="334" r:id="rId8"/>
-    <p:sldId id="335" r:id="rId9"/>
-    <p:sldId id="300" r:id="rId10"/>
-    <p:sldId id="327" r:id="rId11"/>
-    <p:sldId id="268" r:id="rId12"/>
-    <p:sldId id="324" r:id="rId13"/>
-    <p:sldId id="328" r:id="rId14"/>
-    <p:sldId id="313" r:id="rId15"/>
-    <p:sldId id="329" r:id="rId16"/>
-    <p:sldId id="325" r:id="rId17"/>
-    <p:sldId id="330" r:id="rId18"/>
-    <p:sldId id="331" r:id="rId19"/>
-    <p:sldId id="263" r:id="rId20"/>
+    <p:sldId id="337" r:id="rId6"/>
+    <p:sldId id="345" r:id="rId7"/>
+    <p:sldId id="338" r:id="rId8"/>
+    <p:sldId id="339" r:id="rId9"/>
+    <p:sldId id="332" r:id="rId10"/>
+    <p:sldId id="340" r:id="rId11"/>
+    <p:sldId id="341" r:id="rId12"/>
+    <p:sldId id="342" r:id="rId13"/>
+    <p:sldId id="343" r:id="rId14"/>
+    <p:sldId id="333" r:id="rId15"/>
+    <p:sldId id="344" r:id="rId16"/>
+    <p:sldId id="346" r:id="rId17"/>
+    <p:sldId id="335" r:id="rId18"/>
+    <p:sldId id="347" r:id="rId19"/>
+    <p:sldId id="348" r:id="rId20"/>
+    <p:sldId id="349" r:id="rId21"/>
+    <p:sldId id="350" r:id="rId22"/>
+    <p:sldId id="351" r:id="rId23"/>
+    <p:sldId id="263" r:id="rId24"/>
   </p:sldIdLst>
   <p:sldSz cx="12192000" cy="6858000"/>
   <p:notesSz cx="6858000" cy="9144000"/>
@@ -461,7 +465,7 @@
           <a:p>
             <a:fld id="{FA16A518-A0C3-4B00-9084-763C6916F68A}" type="datetimeFigureOut">
               <a:rPr lang="zh-TW" altLang="en-US" smtClean="0"/>
-              <a:t>2022/5/17</a:t>
+              <a:t>2022/5/18</a:t>
             </a:fld>
             <a:endParaRPr lang="zh-TW" altLang="en-US"/>
           </a:p>
@@ -755,7 +759,7 @@
           <a:p>
             <a:fld id="{FA16A518-A0C3-4B00-9084-763C6916F68A}" type="datetimeFigureOut">
               <a:rPr lang="zh-TW" altLang="en-US" smtClean="0"/>
-              <a:t>2022/5/17</a:t>
+              <a:t>2022/5/18</a:t>
             </a:fld>
             <a:endParaRPr lang="zh-TW" altLang="en-US"/>
           </a:p>
@@ -1003,7 +1007,7 @@
           <a:p>
             <a:fld id="{FA16A518-A0C3-4B00-9084-763C6916F68A}" type="datetimeFigureOut">
               <a:rPr lang="zh-TW" altLang="en-US" smtClean="0"/>
-              <a:t>2022/5/17</a:t>
+              <a:t>2022/5/18</a:t>
             </a:fld>
             <a:endParaRPr lang="zh-TW" altLang="en-US"/>
           </a:p>
@@ -1342,7 +1346,7 @@
           <a:p>
             <a:fld id="{FA16A518-A0C3-4B00-9084-763C6916F68A}" type="datetimeFigureOut">
               <a:rPr lang="zh-TW" altLang="en-US" smtClean="0"/>
-              <a:t>2022/5/17</a:t>
+              <a:t>2022/5/18</a:t>
             </a:fld>
             <a:endParaRPr lang="zh-TW" altLang="en-US"/>
           </a:p>
@@ -1689,7 +1693,7 @@
           <a:p>
             <a:fld id="{FA16A518-A0C3-4B00-9084-763C6916F68A}" type="datetimeFigureOut">
               <a:rPr lang="zh-TW" altLang="en-US" smtClean="0"/>
-              <a:t>2022/5/17</a:t>
+              <a:t>2022/5/18</a:t>
             </a:fld>
             <a:endParaRPr lang="zh-TW" altLang="en-US"/>
           </a:p>
@@ -2063,7 +2067,7 @@
           <a:p>
             <a:fld id="{FA16A518-A0C3-4B00-9084-763C6916F68A}" type="datetimeFigureOut">
               <a:rPr lang="zh-TW" altLang="en-US" smtClean="0"/>
-              <a:t>2022/5/17</a:t>
+              <a:t>2022/5/18</a:t>
             </a:fld>
             <a:endParaRPr lang="zh-TW" altLang="en-US"/>
           </a:p>
@@ -2533,7 +2537,7 @@
           <a:p>
             <a:fld id="{FA16A518-A0C3-4B00-9084-763C6916F68A}" type="datetimeFigureOut">
               <a:rPr lang="zh-TW" altLang="en-US" smtClean="0"/>
-              <a:t>2022/5/17</a:t>
+              <a:t>2022/5/18</a:t>
             </a:fld>
             <a:endParaRPr lang="zh-TW" altLang="en-US"/>
           </a:p>
@@ -2738,7 +2742,7 @@
           <a:p>
             <a:fld id="{FA16A518-A0C3-4B00-9084-763C6916F68A}" type="datetimeFigureOut">
               <a:rPr lang="zh-TW" altLang="en-US" smtClean="0"/>
-              <a:t>2022/5/17</a:t>
+              <a:t>2022/5/18</a:t>
             </a:fld>
             <a:endParaRPr lang="zh-TW" altLang="en-US"/>
           </a:p>
@@ -2949,7 +2953,7 @@
           <a:p>
             <a:fld id="{FA16A518-A0C3-4B00-9084-763C6916F68A}" type="datetimeFigureOut">
               <a:rPr lang="zh-TW" altLang="en-US" smtClean="0"/>
-              <a:t>2022/5/17</a:t>
+              <a:t>2022/5/18</a:t>
             </a:fld>
             <a:endParaRPr lang="zh-TW" altLang="en-US"/>
           </a:p>
@@ -3150,7 +3154,7 @@
           <a:p>
             <a:fld id="{FA16A518-A0C3-4B00-9084-763C6916F68A}" type="datetimeFigureOut">
               <a:rPr lang="zh-TW" altLang="en-US" smtClean="0"/>
-              <a:t>2022/5/17</a:t>
+              <a:t>2022/5/18</a:t>
             </a:fld>
             <a:endParaRPr lang="zh-TW" altLang="en-US"/>
           </a:p>
@@ -3398,7 +3402,7 @@
           <a:p>
             <a:fld id="{FA16A518-A0C3-4B00-9084-763C6916F68A}" type="datetimeFigureOut">
               <a:rPr lang="zh-TW" altLang="en-US" smtClean="0"/>
-              <a:t>2022/5/17</a:t>
+              <a:t>2022/5/18</a:t>
             </a:fld>
             <a:endParaRPr lang="zh-TW" altLang="en-US"/>
           </a:p>
@@ -3696,7 +3700,7 @@
           <a:p>
             <a:fld id="{FA16A518-A0C3-4B00-9084-763C6916F68A}" type="datetimeFigureOut">
               <a:rPr lang="zh-TW" altLang="en-US" smtClean="0"/>
-              <a:t>2022/5/17</a:t>
+              <a:t>2022/5/18</a:t>
             </a:fld>
             <a:endParaRPr lang="zh-TW" altLang="en-US"/>
           </a:p>
@@ -4090,7 +4094,7 @@
           <a:p>
             <a:fld id="{FA16A518-A0C3-4B00-9084-763C6916F68A}" type="datetimeFigureOut">
               <a:rPr lang="zh-TW" altLang="en-US" smtClean="0"/>
-              <a:t>2022/5/17</a:t>
+              <a:t>2022/5/18</a:t>
             </a:fld>
             <a:endParaRPr lang="zh-TW" altLang="en-US"/>
           </a:p>
@@ -4239,7 +4243,7 @@
           <a:p>
             <a:fld id="{FA16A518-A0C3-4B00-9084-763C6916F68A}" type="datetimeFigureOut">
               <a:rPr lang="zh-TW" altLang="en-US" smtClean="0"/>
-              <a:t>2022/5/17</a:t>
+              <a:t>2022/5/18</a:t>
             </a:fld>
             <a:endParaRPr lang="zh-TW" altLang="en-US"/>
           </a:p>
@@ -4365,7 +4369,7 @@
           <a:p>
             <a:fld id="{FA16A518-A0C3-4B00-9084-763C6916F68A}" type="datetimeFigureOut">
               <a:rPr lang="zh-TW" altLang="en-US" smtClean="0"/>
-              <a:t>2022/5/17</a:t>
+              <a:t>2022/5/18</a:t>
             </a:fld>
             <a:endParaRPr lang="zh-TW" altLang="en-US"/>
           </a:p>
@@ -4620,7 +4624,7 @@
           <a:p>
             <a:fld id="{FA16A518-A0C3-4B00-9084-763C6916F68A}" type="datetimeFigureOut">
               <a:rPr lang="zh-TW" altLang="en-US" smtClean="0"/>
-              <a:t>2022/5/17</a:t>
+              <a:t>2022/5/18</a:t>
             </a:fld>
             <a:endParaRPr lang="zh-TW" altLang="en-US"/>
           </a:p>
@@ -4935,7 +4939,7 @@
           <a:p>
             <a:fld id="{FA16A518-A0C3-4B00-9084-763C6916F68A}" type="datetimeFigureOut">
               <a:rPr lang="zh-TW" altLang="en-US" smtClean="0"/>
-              <a:t>2022/5/17</a:t>
+              <a:t>2022/5/18</a:t>
             </a:fld>
             <a:endParaRPr lang="zh-TW" altLang="en-US"/>
           </a:p>
@@ -5286,7 +5290,7 @@
           <a:p>
             <a:fld id="{FA16A518-A0C3-4B00-9084-763C6916F68A}" type="datetimeFigureOut">
               <a:rPr lang="zh-TW" altLang="en-US" smtClean="0"/>
-              <a:t>2022/5/17</a:t>
+              <a:t>2022/5/18</a:t>
             </a:fld>
             <a:endParaRPr lang="zh-TW" altLang="en-US"/>
           </a:p>
@@ -6051,37 +6055,42 @@
               </a:lnSpc>
             </a:pPr>
             <a:r>
-              <a:rPr lang="en-US" altLang="zh-TW" sz="8900" dirty="0">
+              <a:rPr lang="zh-TW" altLang="en-US" sz="9600" dirty="0">
                 <a:solidFill>
                   <a:schemeClr val="tx1"/>
                 </a:solidFill>
                 <a:latin typeface="微軟正黑體" panose="020B0604030504040204" pitchFamily="34" charset="-120"/>
+                <a:ea typeface="微軟正黑體" panose="020B0604030504040204" pitchFamily="34" charset="-120"/>
               </a:rPr>
-              <a:t>3D</a:t>
-            </a:r>
-            <a:r>
-              <a:rPr lang="zh-TW" altLang="en-US" sz="8900" dirty="0">
+              <a:t>編輯</a:t>
+            </a:r>
+            <a:r>
+              <a:rPr lang="zh-TW" altLang="en-US" sz="9600" dirty="0">
+                <a:solidFill>
+                  <a:srgbClr val="FF0000"/>
+                </a:solidFill>
+                <a:latin typeface="微軟正黑體" panose="020B0604030504040204" pitchFamily="34" charset="-120"/>
+                <a:ea typeface="微軟正黑體" panose="020B0604030504040204" pitchFamily="34" charset="-120"/>
+              </a:rPr>
+              <a:t>地球</a:t>
+            </a:r>
+            <a:r>
+              <a:rPr lang="zh-TW" altLang="en-US" sz="9600" dirty="0">
                 <a:solidFill>
                   <a:schemeClr val="tx1"/>
                 </a:solidFill>
                 <a:latin typeface="微軟正黑體" panose="020B0604030504040204" pitchFamily="34" charset="-120"/>
+                <a:ea typeface="微軟正黑體" panose="020B0604030504040204" pitchFamily="34" charset="-120"/>
               </a:rPr>
-              <a:t>程式 輔助功能</a:t>
-            </a:r>
-            <a:endParaRPr lang="zh-TW" altLang="en-US" sz="9600" dirty="0">
-              <a:solidFill>
-                <a:srgbClr val="FF0000"/>
-              </a:solidFill>
-              <a:latin typeface="微軟正黑體" panose="020B0604030504040204" pitchFamily="34" charset="-120"/>
-              <a:ea typeface="微軟正黑體" panose="020B0604030504040204" pitchFamily="34" charset="-120"/>
-            </a:endParaRPr>
+              <a:t>材質</a:t>
+            </a:r>
           </a:p>
         </p:txBody>
       </p:sp>
     </p:spTree>
     <p:extLst>
       <p:ext uri="{BB962C8B-B14F-4D97-AF65-F5344CB8AC3E}">
-        <p14:creationId xmlns:p14="http://schemas.microsoft.com/office/powerpoint/2010/main" val="949954764"/>
+        <p14:creationId xmlns:p14="http://schemas.microsoft.com/office/powerpoint/2010/main" val="559290924"/>
       </p:ext>
     </p:extLst>
   </p:cSld>
@@ -6228,14 +6237,20 @@
           </a:bodyPr>
           <a:lstStyle/>
           <a:p>
+            <a:pPr>
+              <a:lnSpc>
+                <a:spcPct val="150000"/>
+              </a:lnSpc>
+            </a:pPr>
             <a:r>
               <a:rPr lang="zh-TW" altLang="en-US" sz="9600" dirty="0">
                 <a:solidFill>
                   <a:schemeClr val="tx1"/>
                 </a:solidFill>
                 <a:latin typeface="微軟正黑體" panose="020B0604030504040204" pitchFamily="34" charset="-120"/>
+                <a:ea typeface="微軟正黑體" panose="020B0604030504040204" pitchFamily="34" charset="-120"/>
               </a:rPr>
-              <a:t>顏色</a:t>
+              <a:t>標示</a:t>
             </a:r>
             <a:r>
               <a:rPr lang="zh-TW" altLang="en-US" sz="9600" dirty="0">
@@ -6243,41 +6258,17 @@
                   <a:srgbClr val="FF0000"/>
                 </a:solidFill>
                 <a:latin typeface="微軟正黑體" panose="020B0604030504040204" pitchFamily="34" charset="-120"/>
+                <a:ea typeface="微軟正黑體" panose="020B0604030504040204" pitchFamily="34" charset="-120"/>
               </a:rPr>
-              <a:t> </a:t>
-            </a:r>
-            <a:r>
-              <a:rPr lang="en-US" altLang="zh-TW" sz="9600" dirty="0">
-                <a:solidFill>
-                  <a:srgbClr val="FF0000"/>
-                </a:solidFill>
-                <a:latin typeface="微軟正黑體" panose="020B0604030504040204" pitchFamily="34" charset="-120"/>
-              </a:rPr>
-              <a:t>red </a:t>
-            </a:r>
-            <a:r>
-              <a:rPr lang="zh-TW" altLang="en-US" sz="9600" dirty="0">
-                <a:solidFill>
-                  <a:srgbClr val="FF0000"/>
-                </a:solidFill>
-                <a:latin typeface="微軟正黑體" panose="020B0604030504040204" pitchFamily="34" charset="-120"/>
-              </a:rPr>
-              <a:t>紅</a:t>
-            </a:r>
-            <a:endParaRPr lang="zh-TW" altLang="en-US" sz="9600" dirty="0">
-              <a:solidFill>
-                <a:srgbClr val="FF0000"/>
-              </a:solidFill>
-              <a:latin typeface="微軟正黑體" panose="020B0604030504040204" pitchFamily="34" charset="-120"/>
-              <a:ea typeface="微軟正黑體" panose="020B0604030504040204" pitchFamily="34" charset="-120"/>
-            </a:endParaRPr>
+              <a:t>赤道</a:t>
+            </a:r>
           </a:p>
         </p:txBody>
       </p:sp>
     </p:spTree>
     <p:extLst>
       <p:ext uri="{BB962C8B-B14F-4D97-AF65-F5344CB8AC3E}">
-        <p14:creationId xmlns:p14="http://schemas.microsoft.com/office/powerpoint/2010/main" val="4268710998"/>
+        <p14:creationId xmlns:p14="http://schemas.microsoft.com/office/powerpoint/2010/main" val="2327131945"/>
       </p:ext>
     </p:extLst>
   </p:cSld>
@@ -6424,118 +6415,38 @@
           </a:bodyPr>
           <a:lstStyle/>
           <a:p>
-            <a:r>
-              <a:rPr lang="en-US" altLang="zh-TW" sz="9600" dirty="0">
+            <a:pPr>
+              <a:lnSpc>
+                <a:spcPct val="150000"/>
+              </a:lnSpc>
+            </a:pPr>
+            <a:r>
+              <a:rPr lang="zh-TW" altLang="en-US" sz="9600" dirty="0">
+                <a:solidFill>
+                  <a:srgbClr val="FF0000"/>
+                </a:solidFill>
+                <a:latin typeface="微軟正黑體" panose="020B0604030504040204" pitchFamily="34" charset="-120"/>
+                <a:ea typeface="微軟正黑體" panose="020B0604030504040204" pitchFamily="34" charset="-120"/>
+              </a:rPr>
+              <a:t>由西向東</a:t>
+            </a:r>
+            <a:r>
+              <a:rPr lang="zh-TW" altLang="en-US" sz="9600" dirty="0">
                 <a:solidFill>
                   <a:schemeClr val="tx1"/>
                 </a:solidFill>
                 <a:latin typeface="微軟正黑體" panose="020B0604030504040204" pitchFamily="34" charset="-120"/>
+                <a:ea typeface="微軟正黑體" panose="020B0604030504040204" pitchFamily="34" charset="-120"/>
               </a:rPr>
-              <a:t> </a:t>
-            </a:r>
-            <a:r>
-              <a:rPr lang="en-US" altLang="zh-TW" sz="8000" dirty="0" err="1">
-                <a:solidFill>
-                  <a:schemeClr val="tx1"/>
-                </a:solidFill>
-                <a:latin typeface="微軟正黑體" panose="020B0604030504040204" pitchFamily="34" charset="-120"/>
-              </a:rPr>
-              <a:t>rgb</a:t>
-            </a:r>
-            <a:r>
-              <a:rPr lang="zh-TW" altLang="en-US" sz="8000" dirty="0">
-                <a:solidFill>
-                  <a:schemeClr val="tx1"/>
-                </a:solidFill>
-                <a:latin typeface="微軟正黑體" panose="020B0604030504040204" pitchFamily="34" charset="-120"/>
-              </a:rPr>
-              <a:t>顏色</a:t>
-            </a:r>
-            <a:r>
-              <a:rPr lang="en-US" altLang="zh-TW" sz="8000" dirty="0">
-                <a:solidFill>
-                  <a:schemeClr val="tx1"/>
-                </a:solidFill>
-                <a:latin typeface="微軟正黑體" panose="020B0604030504040204" pitchFamily="34" charset="-120"/>
-              </a:rPr>
-              <a:t> </a:t>
-            </a:r>
-            <a:r>
-              <a:rPr lang="en-US" altLang="zh-TW" sz="8000" dirty="0">
-                <a:solidFill>
-                  <a:srgbClr val="FF0000"/>
-                </a:solidFill>
-                <a:latin typeface="微軟正黑體" panose="020B0604030504040204" pitchFamily="34" charset="-120"/>
-              </a:rPr>
-              <a:t>255, 255, 0</a:t>
-            </a:r>
-            <a:br>
-              <a:rPr lang="en-US" altLang="zh-TW" sz="8000" dirty="0">
-                <a:solidFill>
-                  <a:srgbClr val="FF0000"/>
-                </a:solidFill>
-                <a:latin typeface="微軟正黑體" panose="020B0604030504040204" pitchFamily="34" charset="-120"/>
-              </a:rPr>
-            </a:br>
-            <a:r>
-              <a:rPr lang="zh-TW" altLang="en-US" sz="8000" dirty="0">
-                <a:solidFill>
-                  <a:schemeClr val="tx1"/>
-                </a:solidFill>
-                <a:latin typeface="微軟正黑體" panose="020B0604030504040204" pitchFamily="34" charset="-120"/>
-              </a:rPr>
-              <a:t>紅 </a:t>
-            </a:r>
-            <a:r>
-              <a:rPr lang="en-US" altLang="zh-TW" sz="8000" dirty="0">
-                <a:solidFill>
-                  <a:schemeClr val="tx1"/>
-                </a:solidFill>
-                <a:latin typeface="微軟正黑體" panose="020B0604030504040204" pitchFamily="34" charset="-120"/>
-              </a:rPr>
-              <a:t>+ </a:t>
-            </a:r>
-            <a:r>
-              <a:rPr lang="zh-TW" altLang="en-US" sz="8000" dirty="0">
-                <a:solidFill>
-                  <a:schemeClr val="tx1"/>
-                </a:solidFill>
-                <a:latin typeface="微軟正黑體" panose="020B0604030504040204" pitchFamily="34" charset="-120"/>
-              </a:rPr>
-              <a:t>綠 </a:t>
-            </a:r>
-            <a:r>
-              <a:rPr lang="en-US" altLang="zh-TW" sz="8000" dirty="0">
-                <a:solidFill>
-                  <a:schemeClr val="tx1"/>
-                </a:solidFill>
-                <a:latin typeface="微軟正黑體" panose="020B0604030504040204" pitchFamily="34" charset="-120"/>
-              </a:rPr>
-              <a:t>= </a:t>
-            </a:r>
-            <a:r>
-              <a:rPr lang="zh-TW" altLang="en-US" sz="8000" dirty="0">
-                <a:solidFill>
-                  <a:srgbClr val="FF0000"/>
-                </a:solidFill>
-                <a:latin typeface="微軟正黑體" panose="020B0604030504040204" pitchFamily="34" charset="-120"/>
-              </a:rPr>
-              <a:t>黃</a:t>
-            </a:r>
-            <a:endParaRPr lang="zh-TW" altLang="en-US" sz="9600" dirty="0">
-              <a:solidFill>
-                <a:srgbClr val="FF0000"/>
-              </a:solidFill>
-              <a:latin typeface="微軟正黑體" panose="020B0604030504040204" pitchFamily="34" charset="-120"/>
-              <a:ea typeface="微軟正黑體" panose="020B0604030504040204" pitchFamily="34" charset="-120"/>
-            </a:endParaRPr>
+              <a:t>自轉</a:t>
+            </a:r>
           </a:p>
         </p:txBody>
       </p:sp>
     </p:spTree>
     <p:extLst>
       <p:ext uri="{BB962C8B-B14F-4D97-AF65-F5344CB8AC3E}">
-        <p14:creationId xmlns:p14="http://schemas.microsoft.com/office/powerpoint/2010/main" val="1112885527"/>
+        <p14:creationId xmlns:p14="http://schemas.microsoft.com/office/powerpoint/2010/main" val="3842796062"/>
       </p:ext>
     </p:extLst>
   </p:cSld>
@@ -6682,47 +6593,57 @@
           </a:bodyPr>
           <a:lstStyle/>
           <a:p>
-            <a:r>
+            <a:pPr>
+              <a:lnSpc>
+                <a:spcPct val="150000"/>
+              </a:lnSpc>
+            </a:pPr>
+            <a:r>
+              <a:rPr lang="zh-TW" altLang="en-US" sz="9600" dirty="0">
+                <a:solidFill>
+                  <a:schemeClr val="tx1"/>
+                </a:solidFill>
+                <a:latin typeface="微軟正黑體" panose="020B0604030504040204" pitchFamily="34" charset="-120"/>
+                <a:ea typeface="微軟正黑體" panose="020B0604030504040204" pitchFamily="34" charset="-120"/>
+              </a:rPr>
+              <a:t>由北極觀察</a:t>
+            </a:r>
+            <a:br>
               <a:rPr lang="en-US" altLang="zh-TW" sz="9600" dirty="0">
                 <a:solidFill>
+                  <a:srgbClr val="FF0000"/>
+                </a:solidFill>
+                <a:latin typeface="微軟正黑體" panose="020B0604030504040204" pitchFamily="34" charset="-120"/>
+                <a:ea typeface="微軟正黑體" panose="020B0604030504040204" pitchFamily="34" charset="-120"/>
+              </a:rPr>
+            </a:br>
+            <a:r>
+              <a:rPr lang="zh-TW" altLang="en-US" sz="9600" dirty="0">
+                <a:solidFill>
+                  <a:srgbClr val="FF0000"/>
+                </a:solidFill>
+                <a:latin typeface="微軟正黑體" panose="020B0604030504040204" pitchFamily="34" charset="-120"/>
+                <a:ea typeface="微軟正黑體" panose="020B0604030504040204" pitchFamily="34" charset="-120"/>
+              </a:rPr>
+              <a:t>逆時針</a:t>
+            </a:r>
+            <a:r>
+              <a:rPr lang="zh-TW" altLang="en-US" sz="9600" dirty="0">
+                <a:solidFill>
                   <a:schemeClr val="tx1"/>
                 </a:solidFill>
                 <a:latin typeface="微軟正黑體" panose="020B0604030504040204" pitchFamily="34" charset="-120"/>
+                <a:ea typeface="微軟正黑體" panose="020B0604030504040204" pitchFamily="34" charset="-120"/>
               </a:rPr>
-              <a:t> </a:t>
-            </a:r>
-            <a:r>
-              <a:rPr lang="zh-TW" altLang="en-US" sz="9600" dirty="0">
-                <a:solidFill>
-                  <a:schemeClr val="tx1"/>
-                </a:solidFill>
-                <a:latin typeface="微軟正黑體" panose="020B0604030504040204" pitchFamily="34" charset="-120"/>
-              </a:rPr>
-              <a:t>位置</a:t>
-            </a:r>
-            <a:r>
-              <a:rPr lang="en-US" altLang="zh-TW" sz="9600" dirty="0">
-                <a:solidFill>
-                  <a:schemeClr val="tx1"/>
-                </a:solidFill>
-                <a:latin typeface="微軟正黑體" panose="020B0604030504040204" pitchFamily="34" charset="-120"/>
-              </a:rPr>
-              <a:t>x = -2</a:t>
-            </a:r>
-            <a:endParaRPr lang="zh-TW" altLang="en-US" sz="9600" dirty="0">
-              <a:solidFill>
-                <a:srgbClr val="FF0000"/>
-              </a:solidFill>
-              <a:latin typeface="微軟正黑體" panose="020B0604030504040204" pitchFamily="34" charset="-120"/>
-              <a:ea typeface="微軟正黑體" panose="020B0604030504040204" pitchFamily="34" charset="-120"/>
-            </a:endParaRPr>
+              <a:t>自轉</a:t>
+            </a:r>
           </a:p>
         </p:txBody>
       </p:sp>
     </p:spTree>
     <p:extLst>
       <p:ext uri="{BB962C8B-B14F-4D97-AF65-F5344CB8AC3E}">
-        <p14:creationId xmlns:p14="http://schemas.microsoft.com/office/powerpoint/2010/main" val="2715053046"/>
+        <p14:creationId xmlns:p14="http://schemas.microsoft.com/office/powerpoint/2010/main" val="3556745213"/>
       </p:ext>
     </p:extLst>
   </p:cSld>
@@ -6857,7 +6778,7 @@
         </p:nvSpPr>
         <p:spPr>
           <a:xfrm>
-            <a:off x="2622850" y="2671233"/>
+            <a:off x="2762810" y="2671233"/>
             <a:ext cx="6815669" cy="1515533"/>
           </a:xfrm>
           <a:prstGeom prst="rect">
@@ -6954,7 +6875,7 @@
                 <a:latin typeface="Berlin Sans FB" panose="020E0602020502020306" pitchFamily="34" charset="0"/>
                 <a:ea typeface="微軟正黑體 Light" panose="020B0304030504040204" pitchFamily="34" charset="-120"/>
               </a:rPr>
-              <a:t>材質貼圖</a:t>
+              <a:t>地球自轉</a:t>
             </a:r>
           </a:p>
         </p:txBody>
@@ -6962,7 +6883,7 @@
     </p:spTree>
     <p:extLst>
       <p:ext uri="{BB962C8B-B14F-4D97-AF65-F5344CB8AC3E}">
-        <p14:creationId xmlns:p14="http://schemas.microsoft.com/office/powerpoint/2010/main" val="4210678064"/>
+        <p14:creationId xmlns:p14="http://schemas.microsoft.com/office/powerpoint/2010/main" val="3080278468"/>
       </p:ext>
     </p:extLst>
   </p:cSld>
@@ -7030,12 +6951,12 @@
                 <a:latin typeface="微軟正黑體" panose="020B0604030504040204" pitchFamily="34" charset="-120"/>
                 <a:ea typeface="微軟正黑體" panose="020B0604030504040204" pitchFamily="34" charset="-120"/>
               </a:rPr>
-              <a:t>新增立方體</a:t>
+              <a:t>事件</a:t>
             </a:r>
             <a:br>
               <a:rPr lang="en-US" altLang="zh-TW" sz="9600" dirty="0">
                 <a:solidFill>
-                  <a:schemeClr val="tx1"/>
+                  <a:srgbClr val="FF0000"/>
                 </a:solidFill>
                 <a:latin typeface="微軟正黑體" panose="020B0604030504040204" pitchFamily="34" charset="-120"/>
                 <a:ea typeface="微軟正黑體" panose="020B0604030504040204" pitchFamily="34" charset="-120"/>
@@ -7044,36 +6965,16 @@
             <a:r>
               <a:rPr lang="zh-TW" altLang="en-US" sz="9600" dirty="0">
                 <a:solidFill>
-                  <a:schemeClr val="tx1"/>
+                  <a:srgbClr val="FF0000"/>
                 </a:solidFill>
                 <a:latin typeface="微軟正黑體" panose="020B0604030504040204" pitchFamily="34" charset="-120"/>
                 <a:ea typeface="微軟正黑體" panose="020B0604030504040204" pitchFamily="34" charset="-120"/>
               </a:rPr>
-              <a:t>改為</a:t>
-            </a:r>
-            <a:r>
-              <a:rPr lang="zh-TW" altLang="en-US" sz="9600" dirty="0">
-                <a:solidFill>
-                  <a:srgbClr val="FF0000"/>
-                </a:solidFill>
-                <a:latin typeface="微軟正黑體" panose="020B0604030504040204" pitchFamily="34" charset="-120"/>
-                <a:ea typeface="微軟正黑體" panose="020B0604030504040204" pitchFamily="34" charset="-120"/>
-              </a:rPr>
-              <a:t>物體</a:t>
-            </a:r>
-            <a:r>
-              <a:rPr lang="en-US" altLang="zh-TW" sz="9600" dirty="0">
-                <a:solidFill>
-                  <a:srgbClr val="FF0000"/>
-                </a:solidFill>
-                <a:latin typeface="微軟正黑體" panose="020B0604030504040204" pitchFamily="34" charset="-120"/>
-                <a:ea typeface="微軟正黑體" panose="020B0604030504040204" pitchFamily="34" charset="-120"/>
-              </a:rPr>
-              <a:t>2</a:t>
+              <a:t>當更新時</a:t>
             </a:r>
             <a:endParaRPr lang="zh-TW" altLang="en-US" sz="9600" dirty="0">
               <a:solidFill>
-                <a:srgbClr val="FF0000"/>
+                <a:schemeClr val="tx1"/>
               </a:solidFill>
               <a:latin typeface="微軟正黑體" panose="020B0604030504040204" pitchFamily="34" charset="-120"/>
               <a:ea typeface="微軟正黑體" panose="020B0604030504040204" pitchFamily="34" charset="-120"/>
@@ -7084,7 +6985,7 @@
     </p:spTree>
     <p:extLst>
       <p:ext uri="{BB962C8B-B14F-4D97-AF65-F5344CB8AC3E}">
-        <p14:creationId xmlns:p14="http://schemas.microsoft.com/office/powerpoint/2010/main" val="986473463"/>
+        <p14:creationId xmlns:p14="http://schemas.microsoft.com/office/powerpoint/2010/main" val="3572061122"/>
       </p:ext>
     </p:extLst>
   </p:cSld>
@@ -7244,7 +7145,7 @@
                 <a:latin typeface="微軟正黑體" panose="020B0604030504040204" pitchFamily="34" charset="-120"/>
                 <a:ea typeface="微軟正黑體" panose="020B0604030504040204" pitchFamily="34" charset="-120"/>
               </a:rPr>
-              <a:t>物體</a:t>
+              <a:t>旋轉</a:t>
             </a:r>
             <a:r>
               <a:rPr lang="en-US" altLang="zh-TW" sz="9600" dirty="0">
@@ -7254,17 +7155,26 @@
                 <a:latin typeface="微軟正黑體" panose="020B0604030504040204" pitchFamily="34" charset="-120"/>
                 <a:ea typeface="微軟正黑體" panose="020B0604030504040204" pitchFamily="34" charset="-120"/>
               </a:rPr>
-              <a:t>2 </a:t>
-            </a:r>
-            <a:r>
-              <a:rPr lang="zh-TW" altLang="en-US" sz="9600" dirty="0">
+              <a:t>y -= 0.1</a:t>
+            </a:r>
+            <a:br>
+              <a:rPr lang="en-US" altLang="zh-TW" sz="9600" dirty="0">
                 <a:solidFill>
                   <a:schemeClr val="tx1"/>
                 </a:solidFill>
                 <a:latin typeface="微軟正黑體" panose="020B0604030504040204" pitchFamily="34" charset="-120"/>
                 <a:ea typeface="微軟正黑體" panose="020B0604030504040204" pitchFamily="34" charset="-120"/>
               </a:rPr>
-              <a:t>材質貼圖</a:t>
+            </a:br>
+            <a:r>
+              <a:rPr lang="zh-TW" altLang="en-US" sz="9600" dirty="0">
+                <a:solidFill>
+                  <a:srgbClr val="FF0000"/>
+                </a:solidFill>
+                <a:latin typeface="微軟正黑體" panose="020B0604030504040204" pitchFamily="34" charset="-120"/>
+                <a:ea typeface="微軟正黑體" panose="020B0604030504040204" pitchFamily="34" charset="-120"/>
+              </a:rPr>
+              <a:t>減後設值</a:t>
             </a:r>
           </a:p>
         </p:txBody>
@@ -7272,7 +7182,7 @@
     </p:spTree>
     <p:extLst>
       <p:ext uri="{BB962C8B-B14F-4D97-AF65-F5344CB8AC3E}">
-        <p14:creationId xmlns:p14="http://schemas.microsoft.com/office/powerpoint/2010/main" val="3487272815"/>
+        <p14:creationId xmlns:p14="http://schemas.microsoft.com/office/powerpoint/2010/main" val="193407330"/>
       </p:ext>
     </p:extLst>
   </p:cSld>
@@ -7393,85 +7303,118 @@
       </p:grpSpPr>
       <p:sp>
         <p:nvSpPr>
-          <p:cNvPr id="2" name="標題 1">
+          <p:cNvPr id="4" name="標題 1">
             <a:extLst>
               <a:ext uri="{FF2B5EF4-FFF2-40B4-BE49-F238E27FC236}">
-                <a16:creationId xmlns:a16="http://schemas.microsoft.com/office/drawing/2014/main" id="{60856E43-3621-4F02-B0E9-EF43423F3E70}"/>
+                <a16:creationId xmlns:a16="http://schemas.microsoft.com/office/drawing/2014/main" id="{9EADEA97-424F-499B-A6C4-A6DCEE800E72}"/>
               </a:ext>
             </a:extLst>
           </p:cNvPr>
-          <p:cNvSpPr>
-            <a:spLocks noGrp="1"/>
-          </p:cNvSpPr>
-          <p:nvPr>
-            <p:ph type="title"/>
-          </p:nvPr>
+          <p:cNvSpPr txBox="1">
+            <a:spLocks/>
+          </p:cNvSpPr>
+          <p:nvPr/>
         </p:nvSpPr>
         <p:spPr>
           <a:xfrm>
-            <a:off x="1000979" y="740808"/>
-            <a:ext cx="10419907" cy="5082362"/>
+            <a:off x="2762810" y="2671233"/>
+            <a:ext cx="6815669" cy="1515533"/>
           </a:xfrm>
+          <a:prstGeom prst="rect">
+            <a:avLst/>
+          </a:prstGeom>
+          <a:effectLst/>
         </p:spPr>
         <p:txBody>
-          <a:bodyPr>
-            <a:normAutofit/>
+          <a:bodyPr vert="horz" lIns="91440" tIns="45720" rIns="91440" bIns="45720" rtlCol="0" anchor="b">
+            <a:noAutofit/>
           </a:bodyPr>
-          <a:lstStyle/>
-          <a:p>
-            <a:pPr>
-              <a:lnSpc>
-                <a:spcPct val="150000"/>
-              </a:lnSpc>
-            </a:pPr>
-            <a:r>
-              <a:rPr lang="zh-TW" altLang="en-US" sz="9600" dirty="0">
-                <a:solidFill>
-                  <a:schemeClr val="tx1"/>
-                </a:solidFill>
-                <a:latin typeface="微軟正黑體" panose="020B0604030504040204" pitchFamily="34" charset="-120"/>
-                <a:ea typeface="微軟正黑體" panose="020B0604030504040204" pitchFamily="34" charset="-120"/>
+          <a:lstStyle>
+            <a:lvl1pPr algn="ctr" defTabSz="457200" rtl="0" eaLnBrk="1" latinLnBrk="0" hangingPunct="1">
+              <a:spcBef>
+                <a:spcPct val="0"/>
+              </a:spcBef>
+              <a:buNone/>
+              <a:defRPr sz="5400" kern="1200" cap="none">
+                <a:ln w="3175" cmpd="sng">
+                  <a:noFill/>
+                </a:ln>
+                <a:solidFill>
+                  <a:schemeClr val="tx1">
+                    <a:lumMod val="85000"/>
+                    <a:lumOff val="15000"/>
+                  </a:schemeClr>
+                </a:solidFill>
+                <a:effectLst/>
+                <a:latin typeface="+mj-lt"/>
+                <a:ea typeface="+mj-ea"/>
+                <a:cs typeface="+mj-cs"/>
+              </a:defRPr>
+            </a:lvl1pPr>
+            <a:lvl2pPr eaLnBrk="1" hangingPunct="1">
+              <a:defRPr>
+                <a:solidFill>
+                  <a:schemeClr val="tx2"/>
+                </a:solidFill>
+              </a:defRPr>
+            </a:lvl2pPr>
+            <a:lvl3pPr eaLnBrk="1" hangingPunct="1">
+              <a:defRPr>
+                <a:solidFill>
+                  <a:schemeClr val="tx2"/>
+                </a:solidFill>
+              </a:defRPr>
+            </a:lvl3pPr>
+            <a:lvl4pPr eaLnBrk="1" hangingPunct="1">
+              <a:defRPr>
+                <a:solidFill>
+                  <a:schemeClr val="tx2"/>
+                </a:solidFill>
+              </a:defRPr>
+            </a:lvl4pPr>
+            <a:lvl5pPr eaLnBrk="1" hangingPunct="1">
+              <a:defRPr>
+                <a:solidFill>
+                  <a:schemeClr val="tx2"/>
+                </a:solidFill>
+              </a:defRPr>
+            </a:lvl5pPr>
+            <a:lvl6pPr eaLnBrk="1" hangingPunct="1">
+              <a:defRPr>
+                <a:solidFill>
+                  <a:schemeClr val="tx2"/>
+                </a:solidFill>
+              </a:defRPr>
+            </a:lvl6pPr>
+            <a:lvl7pPr eaLnBrk="1" hangingPunct="1">
+              <a:defRPr>
+                <a:solidFill>
+                  <a:schemeClr val="tx2"/>
+                </a:solidFill>
+              </a:defRPr>
+            </a:lvl7pPr>
+            <a:lvl8pPr eaLnBrk="1" hangingPunct="1">
+              <a:defRPr>
+                <a:solidFill>
+                  <a:schemeClr val="tx2"/>
+                </a:solidFill>
+              </a:defRPr>
+            </a:lvl8pPr>
+            <a:lvl9pPr eaLnBrk="1" hangingPunct="1">
+              <a:defRPr>
+                <a:solidFill>
+                  <a:schemeClr val="tx2"/>
+                </a:solidFill>
+              </a:defRPr>
+            </a:lvl9pPr>
+          </a:lstStyle>
+          <a:p>
+            <a:r>
+              <a:rPr lang="zh-TW" altLang="en-US" sz="8000" dirty="0">
+                <a:latin typeface="Berlin Sans FB" panose="020E0602020502020306" pitchFamily="34" charset="0"/>
+                <a:ea typeface="微軟正黑體 Light" panose="020B0304030504040204" pitchFamily="34" charset="-120"/>
               </a:rPr>
-              <a:t>匯入 </a:t>
-            </a:r>
-            <a:r>
-              <a:rPr lang="zh-TW" altLang="en-US" sz="9600" dirty="0">
-                <a:solidFill>
-                  <a:srgbClr val="FF0000"/>
-                </a:solidFill>
-                <a:latin typeface="微軟正黑體" panose="020B0604030504040204" pitchFamily="34" charset="-120"/>
-                <a:ea typeface="微軟正黑體" panose="020B0604030504040204" pitchFamily="34" charset="-120"/>
-              </a:rPr>
-              <a:t>範例材質</a:t>
-            </a:r>
-            <a:br>
-              <a:rPr lang="en-US" altLang="zh-TW" sz="9600" dirty="0">
-                <a:solidFill>
-                  <a:schemeClr val="tx1"/>
-                </a:solidFill>
-                <a:latin typeface="微軟正黑體" panose="020B0604030504040204" pitchFamily="34" charset="-120"/>
-                <a:ea typeface="微軟正黑體" panose="020B0604030504040204" pitchFamily="34" charset="-120"/>
-              </a:rPr>
-            </a:br>
-            <a:r>
-              <a:rPr lang="zh-TW" altLang="en-US" sz="9600" dirty="0">
-                <a:solidFill>
-                  <a:schemeClr val="tx1"/>
-                </a:solidFill>
-                <a:latin typeface="微軟正黑體" panose="020B0604030504040204" pitchFamily="34" charset="-120"/>
-                <a:ea typeface="微軟正黑體" panose="020B0604030504040204" pitchFamily="34" charset="-120"/>
-              </a:rPr>
-              <a:t>貼上</a:t>
-            </a:r>
-            <a:r>
-              <a:rPr lang="zh-TW" altLang="en-US" sz="9600" dirty="0">
-                <a:solidFill>
-                  <a:srgbClr val="FF0000"/>
-                </a:solidFill>
-                <a:latin typeface="微軟正黑體" panose="020B0604030504040204" pitchFamily="34" charset="-120"/>
-                <a:ea typeface="微軟正黑體" panose="020B0604030504040204" pitchFamily="34" charset="-120"/>
-              </a:rPr>
-              <a:t>材質檔名</a:t>
+              <a:t>地球傾斜</a:t>
             </a:r>
           </a:p>
         </p:txBody>
@@ -7479,105 +7422,13 @@
     </p:spTree>
     <p:extLst>
       <p:ext uri="{BB962C8B-B14F-4D97-AF65-F5344CB8AC3E}">
-        <p14:creationId xmlns:p14="http://schemas.microsoft.com/office/powerpoint/2010/main" val="30292264"/>
+        <p14:creationId xmlns:p14="http://schemas.microsoft.com/office/powerpoint/2010/main" val="2073822058"/>
       </p:ext>
     </p:extLst>
   </p:cSld>
   <p:clrMapOvr>
     <a:masterClrMapping/>
   </p:clrMapOvr>
-  <p:timing>
-    <p:tnLst>
-      <p:par>
-        <p:cTn id="1" dur="indefinite" restart="never" nodeType="tmRoot">
-          <p:childTnLst>
-            <p:seq concurrent="1" nextAc="seek">
-              <p:cTn id="2" dur="indefinite" nodeType="mainSeq">
-                <p:childTnLst>
-                  <p:par>
-                    <p:cTn id="3" fill="hold">
-                      <p:stCondLst>
-                        <p:cond delay="indefinite"/>
-                        <p:cond evt="onBegin" delay="0">
-                          <p:tn val="2"/>
-                        </p:cond>
-                      </p:stCondLst>
-                      <p:childTnLst>
-                        <p:par>
-                          <p:cTn id="4" fill="hold">
-                            <p:stCondLst>
-                              <p:cond delay="0"/>
-                            </p:stCondLst>
-                            <p:childTnLst>
-                              <p:par>
-                                <p:cTn id="5" presetID="22" presetClass="entr" presetSubtype="4" fill="hold" grpId="0" nodeType="afterEffect">
-                                  <p:stCondLst>
-                                    <p:cond delay="0"/>
-                                  </p:stCondLst>
-                                  <p:iterate type="lt">
-                                    <p:tmPct val="100000"/>
-                                  </p:iterate>
-                                  <p:childTnLst>
-                                    <p:set>
-                                      <p:cBhvr>
-                                        <p:cTn id="6" dur="1" fill="hold">
-                                          <p:stCondLst>
-                                            <p:cond delay="0"/>
-                                          </p:stCondLst>
-                                        </p:cTn>
-                                        <p:tgtEl>
-                                          <p:spTgt spid="2"/>
-                                        </p:tgtEl>
-                                        <p:attrNameLst>
-                                          <p:attrName>style.visibility</p:attrName>
-                                        </p:attrNameLst>
-                                      </p:cBhvr>
-                                      <p:to>
-                                        <p:strVal val="visible"/>
-                                      </p:to>
-                                    </p:set>
-                                    <p:animEffect transition="in" filter="wipe(down)">
-                                      <p:cBhvr>
-                                        <p:cTn id="7" dur="250"/>
-                                        <p:tgtEl>
-                                          <p:spTgt spid="2"/>
-                                        </p:tgtEl>
-                                      </p:cBhvr>
-                                    </p:animEffect>
-                                  </p:childTnLst>
-                                </p:cTn>
-                              </p:par>
-                            </p:childTnLst>
-                          </p:cTn>
-                        </p:par>
-                      </p:childTnLst>
-                    </p:cTn>
-                  </p:par>
-                </p:childTnLst>
-              </p:cTn>
-              <p:prevCondLst>
-                <p:cond evt="onPrev" delay="0">
-                  <p:tgtEl>
-                    <p:sldTgt/>
-                  </p:tgtEl>
-                </p:cond>
-              </p:prevCondLst>
-              <p:nextCondLst>
-                <p:cond evt="onNext" delay="0">
-                  <p:tgtEl>
-                    <p:sldTgt/>
-                  </p:tgtEl>
-                </p:cond>
-              </p:nextCondLst>
-            </p:seq>
-          </p:childTnLst>
-        </p:cTn>
-      </p:par>
-    </p:tnLst>
-    <p:bldLst>
-      <p:bldP spid="2" grpId="0"/>
-    </p:bldLst>
-  </p:timing>
 </p:sld>
 </file>
 
@@ -7637,8 +7488,9 @@
                   <a:schemeClr val="tx1"/>
                 </a:solidFill>
                 <a:latin typeface="微軟正黑體" panose="020B0604030504040204" pitchFamily="34" charset="-120"/>
+                <a:ea typeface="微軟正黑體" panose="020B0604030504040204" pitchFamily="34" charset="-120"/>
               </a:rPr>
-              <a:t>試試看不同材質</a:t>
+              <a:t>新增直線</a:t>
             </a:r>
             <a:endParaRPr lang="zh-TW" altLang="en-US" sz="9600" dirty="0">
               <a:solidFill>
@@ -7653,7 +7505,7 @@
     </p:spTree>
     <p:extLst>
       <p:ext uri="{BB962C8B-B14F-4D97-AF65-F5344CB8AC3E}">
-        <p14:creationId xmlns:p14="http://schemas.microsoft.com/office/powerpoint/2010/main" val="612409668"/>
+        <p14:creationId xmlns:p14="http://schemas.microsoft.com/office/powerpoint/2010/main" val="2703393559"/>
       </p:ext>
     </p:extLst>
   </p:cSld>
@@ -7777,7 +7629,7 @@
           <p:cNvPr id="2" name="標題 1">
             <a:extLst>
               <a:ext uri="{FF2B5EF4-FFF2-40B4-BE49-F238E27FC236}">
-                <a16:creationId xmlns:a16="http://schemas.microsoft.com/office/drawing/2014/main" id="{E39515FA-8C05-415A-9171-15D6B608FF2D}"/>
+                <a16:creationId xmlns:a16="http://schemas.microsoft.com/office/drawing/2014/main" id="{60856E43-3621-4F02-B0E9-EF43423F3E70}"/>
               </a:ext>
             </a:extLst>
           </p:cNvPr>
@@ -7785,25 +7637,74 @@
             <a:spLocks noGrp="1"/>
           </p:cNvSpPr>
           <p:nvPr>
-            <p:ph type="ctrTitle"/>
+            <p:ph type="title"/>
           </p:nvPr>
         </p:nvSpPr>
         <p:spPr>
           <a:xfrm>
-            <a:off x="2688165" y="2671233"/>
-            <a:ext cx="6815669" cy="1515533"/>
+            <a:off x="1000979" y="740808"/>
+            <a:ext cx="10419907" cy="5082362"/>
           </a:xfrm>
         </p:spPr>
         <p:txBody>
-          <a:bodyPr/>
+          <a:bodyPr>
+            <a:normAutofit/>
+          </a:bodyPr>
           <a:lstStyle/>
           <a:p>
+            <a:pPr>
+              <a:lnSpc>
+                <a:spcPct val="150000"/>
+              </a:lnSpc>
+            </a:pPr>
             <a:r>
               <a:rPr lang="zh-TW" altLang="en-US" sz="9600" dirty="0">
-                <a:latin typeface="Berlin Sans FB" panose="020E0602020502020306" pitchFamily="34" charset="0"/>
-                <a:ea typeface="微軟正黑體 Light" panose="020B0304030504040204" pitchFamily="34" charset="-120"/>
+                <a:solidFill>
+                  <a:schemeClr val="tx1"/>
+                </a:solidFill>
+                <a:latin typeface="微軟正黑體" panose="020B0604030504040204" pitchFamily="34" charset="-120"/>
+                <a:ea typeface="微軟正黑體" panose="020B0604030504040204" pitchFamily="34" charset="-120"/>
               </a:rPr>
-              <a:t>程式完成</a:t>
+              <a:t>變數改為</a:t>
+            </a:r>
+            <a:r>
+              <a:rPr lang="zh-TW" altLang="en-US" sz="9600" dirty="0">
+                <a:solidFill>
+                  <a:srgbClr val="FF0000"/>
+                </a:solidFill>
+                <a:latin typeface="微軟正黑體" panose="020B0604030504040204" pitchFamily="34" charset="-120"/>
+                <a:ea typeface="微軟正黑體" panose="020B0604030504040204" pitchFamily="34" charset="-120"/>
+              </a:rPr>
+              <a:t>自轉軸</a:t>
+            </a:r>
+            <a:br>
+              <a:rPr lang="en-US" altLang="zh-TW" sz="9600" dirty="0">
+                <a:solidFill>
+                  <a:srgbClr val="FF0000"/>
+                </a:solidFill>
+                <a:latin typeface="微軟正黑體" panose="020B0604030504040204" pitchFamily="34" charset="-120"/>
+                <a:ea typeface="微軟正黑體" panose="020B0604030504040204" pitchFamily="34" charset="-120"/>
+              </a:rPr>
+            </a:br>
+            <a:r>
+              <a:rPr lang="zh-TW" altLang="en-US" sz="9600" dirty="0">
+                <a:solidFill>
+                  <a:schemeClr val="tx1"/>
+                </a:solidFill>
+                <a:latin typeface="微軟正黑體" panose="020B0604030504040204" pitchFamily="34" charset="-120"/>
+                <a:ea typeface="微軟正黑體" panose="020B0604030504040204" pitchFamily="34" charset="-120"/>
+              </a:rPr>
+              <a:t>並加進</a:t>
+            </a:r>
+            <a:r>
+              <a:rPr lang="zh-TW" altLang="en-US" sz="9600" dirty="0">
+                <a:solidFill>
+                  <a:srgbClr val="FF0000"/>
+                </a:solidFill>
+                <a:latin typeface="微軟正黑體" panose="020B0604030504040204" pitchFamily="34" charset="-120"/>
+                <a:ea typeface="微軟正黑體" panose="020B0604030504040204" pitchFamily="34" charset="-120"/>
+              </a:rPr>
+              <a:t>變數清單</a:t>
             </a:r>
           </a:p>
         </p:txBody>
@@ -7811,7 +7712,7 @@
     </p:spTree>
     <p:extLst>
       <p:ext uri="{BB962C8B-B14F-4D97-AF65-F5344CB8AC3E}">
-        <p14:creationId xmlns:p14="http://schemas.microsoft.com/office/powerpoint/2010/main" val="2727996506"/>
+        <p14:creationId xmlns:p14="http://schemas.microsoft.com/office/powerpoint/2010/main" val="467743846"/>
       </p:ext>
     </p:extLst>
   </p:cSld>
@@ -8058,6 +7959,798 @@
                                     <p:animEffect transition="in" filter="wipe(left)">
                                       <p:cBhvr>
                                         <p:cTn id="7" dur="200"/>
+                                        <p:tgtEl>
+                                          <p:spTgt spid="2"/>
+                                        </p:tgtEl>
+                                      </p:cBhvr>
+                                    </p:animEffect>
+                                  </p:childTnLst>
+                                </p:cTn>
+                              </p:par>
+                            </p:childTnLst>
+                          </p:cTn>
+                        </p:par>
+                      </p:childTnLst>
+                    </p:cTn>
+                  </p:par>
+                </p:childTnLst>
+              </p:cTn>
+              <p:prevCondLst>
+                <p:cond evt="onPrev" delay="0">
+                  <p:tgtEl>
+                    <p:sldTgt/>
+                  </p:tgtEl>
+                </p:cond>
+              </p:prevCondLst>
+              <p:nextCondLst>
+                <p:cond evt="onNext" delay="0">
+                  <p:tgtEl>
+                    <p:sldTgt/>
+                  </p:tgtEl>
+                </p:cond>
+              </p:nextCondLst>
+            </p:seq>
+          </p:childTnLst>
+        </p:cTn>
+      </p:par>
+    </p:tnLst>
+    <p:bldLst>
+      <p:bldP spid="2" grpId="0"/>
+    </p:bldLst>
+  </p:timing>
+</p:sld>
+</file>
+
+<file path=ppt/slides/slide20.xml><?xml version="1.0" encoding="utf-8"?>
+<p:sld xmlns:a="http://schemas.openxmlformats.org/drawingml/2006/main" xmlns:r="http://schemas.openxmlformats.org/officeDocument/2006/relationships" xmlns:p="http://schemas.openxmlformats.org/presentationml/2006/main">
+  <p:cSld>
+    <p:spTree>
+      <p:nvGrpSpPr>
+        <p:cNvPr id="1" name=""/>
+        <p:cNvGrpSpPr/>
+        <p:nvPr/>
+      </p:nvGrpSpPr>
+      <p:grpSpPr>
+        <a:xfrm>
+          <a:off x="0" y="0"/>
+          <a:ext cx="0" cy="0"/>
+          <a:chOff x="0" y="0"/>
+          <a:chExt cx="0" cy="0"/>
+        </a:xfrm>
+      </p:grpSpPr>
+      <p:sp>
+        <p:nvSpPr>
+          <p:cNvPr id="2" name="標題 1">
+            <a:extLst>
+              <a:ext uri="{FF2B5EF4-FFF2-40B4-BE49-F238E27FC236}">
+                <a16:creationId xmlns:a16="http://schemas.microsoft.com/office/drawing/2014/main" id="{60856E43-3621-4F02-B0E9-EF43423F3E70}"/>
+              </a:ext>
+            </a:extLst>
+          </p:cNvPr>
+          <p:cNvSpPr>
+            <a:spLocks noGrp="1"/>
+          </p:cNvSpPr>
+          <p:nvPr>
+            <p:ph type="title"/>
+          </p:nvPr>
+        </p:nvSpPr>
+        <p:spPr>
+          <a:xfrm>
+            <a:off x="1000979" y="740808"/>
+            <a:ext cx="10419907" cy="5082362"/>
+          </a:xfrm>
+        </p:spPr>
+        <p:txBody>
+          <a:bodyPr>
+            <a:normAutofit/>
+          </a:bodyPr>
+          <a:lstStyle/>
+          <a:p>
+            <a:r>
+              <a:rPr lang="zh-TW" altLang="en-US" sz="9600" dirty="0">
+                <a:solidFill>
+                  <a:schemeClr val="tx1"/>
+                </a:solidFill>
+                <a:latin typeface="微軟正黑體" panose="020B0604030504040204" pitchFamily="34" charset="-120"/>
+                <a:ea typeface="微軟正黑體" panose="020B0604030504040204" pitchFamily="34" charset="-120"/>
+              </a:rPr>
+              <a:t>自轉軸</a:t>
+            </a:r>
+            <a:r>
+              <a:rPr lang="zh-TW" altLang="en-US" sz="9600" dirty="0">
+                <a:solidFill>
+                  <a:schemeClr val="tx1"/>
+                </a:solidFill>
+                <a:latin typeface="微軟正黑體" panose="020B0604030504040204" pitchFamily="34" charset="-120"/>
+              </a:rPr>
+              <a:t>傾斜</a:t>
+            </a:r>
+            <a:br>
+              <a:rPr lang="en-US" altLang="zh-TW" sz="9600" dirty="0">
+                <a:solidFill>
+                  <a:schemeClr val="tx1"/>
+                </a:solidFill>
+                <a:latin typeface="微軟正黑體" panose="020B0604030504040204" pitchFamily="34" charset="-120"/>
+              </a:rPr>
+            </a:br>
+            <a:r>
+              <a:rPr lang="zh-TW" altLang="en-US" sz="9600" dirty="0">
+                <a:solidFill>
+                  <a:srgbClr val="FF0000"/>
+                </a:solidFill>
+                <a:latin typeface="微軟正黑體" panose="020B0604030504040204" pitchFamily="34" charset="-120"/>
+              </a:rPr>
+              <a:t>旋轉</a:t>
+            </a:r>
+            <a:r>
+              <a:rPr lang="en-US" altLang="zh-TW" sz="9600" dirty="0">
+                <a:solidFill>
+                  <a:srgbClr val="FF0000"/>
+                </a:solidFill>
+                <a:latin typeface="微軟正黑體" panose="020B0604030504040204" pitchFamily="34" charset="-120"/>
+              </a:rPr>
+              <a:t>z</a:t>
+            </a:r>
+            <a:r>
+              <a:rPr lang="zh-TW" altLang="en-US" sz="9600" dirty="0">
+                <a:solidFill>
+                  <a:schemeClr val="tx1"/>
+                </a:solidFill>
+                <a:latin typeface="微軟正黑體" panose="020B0604030504040204" pitchFamily="34" charset="-120"/>
+              </a:rPr>
+              <a:t>為</a:t>
+            </a:r>
+            <a:r>
+              <a:rPr lang="en-US" altLang="zh-TW" sz="9600" dirty="0">
+                <a:solidFill>
+                  <a:srgbClr val="FF0000"/>
+                </a:solidFill>
+                <a:latin typeface="微軟正黑體" panose="020B0604030504040204" pitchFamily="34" charset="-120"/>
+              </a:rPr>
+              <a:t>23.5</a:t>
+            </a:r>
+            <a:r>
+              <a:rPr lang="zh-TW" altLang="en-US" sz="9600" dirty="0">
+                <a:solidFill>
+                  <a:srgbClr val="FF0000"/>
+                </a:solidFill>
+                <a:latin typeface="微軟正黑體" panose="020B0604030504040204" pitchFamily="34" charset="-120"/>
+              </a:rPr>
+              <a:t>度</a:t>
+            </a:r>
+            <a:endParaRPr lang="zh-TW" altLang="en-US" sz="9600" dirty="0">
+              <a:solidFill>
+                <a:srgbClr val="FF0000"/>
+              </a:solidFill>
+              <a:latin typeface="微軟正黑體" panose="020B0604030504040204" pitchFamily="34" charset="-120"/>
+              <a:ea typeface="微軟正黑體" panose="020B0604030504040204" pitchFamily="34" charset="-120"/>
+            </a:endParaRPr>
+          </a:p>
+        </p:txBody>
+      </p:sp>
+    </p:spTree>
+    <p:extLst>
+      <p:ext uri="{BB962C8B-B14F-4D97-AF65-F5344CB8AC3E}">
+        <p14:creationId xmlns:p14="http://schemas.microsoft.com/office/powerpoint/2010/main" val="286701396"/>
+      </p:ext>
+    </p:extLst>
+  </p:cSld>
+  <p:clrMapOvr>
+    <a:masterClrMapping/>
+  </p:clrMapOvr>
+  <p:timing>
+    <p:tnLst>
+      <p:par>
+        <p:cTn id="1" dur="indefinite" restart="never" nodeType="tmRoot">
+          <p:childTnLst>
+            <p:seq concurrent="1" nextAc="seek">
+              <p:cTn id="2" dur="indefinite" nodeType="mainSeq">
+                <p:childTnLst>
+                  <p:par>
+                    <p:cTn id="3" fill="hold">
+                      <p:stCondLst>
+                        <p:cond delay="indefinite"/>
+                        <p:cond evt="onBegin" delay="0">
+                          <p:tn val="2"/>
+                        </p:cond>
+                      </p:stCondLst>
+                      <p:childTnLst>
+                        <p:par>
+                          <p:cTn id="4" fill="hold">
+                            <p:stCondLst>
+                              <p:cond delay="0"/>
+                            </p:stCondLst>
+                            <p:childTnLst>
+                              <p:par>
+                                <p:cTn id="5" presetID="22" presetClass="entr" presetSubtype="4" fill="hold" grpId="0" nodeType="afterEffect">
+                                  <p:stCondLst>
+                                    <p:cond delay="0"/>
+                                  </p:stCondLst>
+                                  <p:iterate type="lt">
+                                    <p:tmPct val="100000"/>
+                                  </p:iterate>
+                                  <p:childTnLst>
+                                    <p:set>
+                                      <p:cBhvr>
+                                        <p:cTn id="6" dur="1" fill="hold">
+                                          <p:stCondLst>
+                                            <p:cond delay="0"/>
+                                          </p:stCondLst>
+                                        </p:cTn>
+                                        <p:tgtEl>
+                                          <p:spTgt spid="2"/>
+                                        </p:tgtEl>
+                                        <p:attrNameLst>
+                                          <p:attrName>style.visibility</p:attrName>
+                                        </p:attrNameLst>
+                                      </p:cBhvr>
+                                      <p:to>
+                                        <p:strVal val="visible"/>
+                                      </p:to>
+                                    </p:set>
+                                    <p:animEffect transition="in" filter="wipe(down)">
+                                      <p:cBhvr>
+                                        <p:cTn id="7" dur="250"/>
+                                        <p:tgtEl>
+                                          <p:spTgt spid="2"/>
+                                        </p:tgtEl>
+                                      </p:cBhvr>
+                                    </p:animEffect>
+                                  </p:childTnLst>
+                                </p:cTn>
+                              </p:par>
+                            </p:childTnLst>
+                          </p:cTn>
+                        </p:par>
+                      </p:childTnLst>
+                    </p:cTn>
+                  </p:par>
+                </p:childTnLst>
+              </p:cTn>
+              <p:prevCondLst>
+                <p:cond evt="onPrev" delay="0">
+                  <p:tgtEl>
+                    <p:sldTgt/>
+                  </p:tgtEl>
+                </p:cond>
+              </p:prevCondLst>
+              <p:nextCondLst>
+                <p:cond evt="onNext" delay="0">
+                  <p:tgtEl>
+                    <p:sldTgt/>
+                  </p:tgtEl>
+                </p:cond>
+              </p:nextCondLst>
+            </p:seq>
+          </p:childTnLst>
+        </p:cTn>
+      </p:par>
+    </p:tnLst>
+    <p:bldLst>
+      <p:bldP spid="2" grpId="0"/>
+    </p:bldLst>
+  </p:timing>
+</p:sld>
+</file>
+
+<file path=ppt/slides/slide21.xml><?xml version="1.0" encoding="utf-8"?>
+<p:sld xmlns:a="http://schemas.openxmlformats.org/drawingml/2006/main" xmlns:r="http://schemas.openxmlformats.org/officeDocument/2006/relationships" xmlns:p="http://schemas.openxmlformats.org/presentationml/2006/main">
+  <p:cSld>
+    <p:spTree>
+      <p:nvGrpSpPr>
+        <p:cNvPr id="1" name=""/>
+        <p:cNvGrpSpPr/>
+        <p:nvPr/>
+      </p:nvGrpSpPr>
+      <p:grpSpPr>
+        <a:xfrm>
+          <a:off x="0" y="0"/>
+          <a:ext cx="0" cy="0"/>
+          <a:chOff x="0" y="0"/>
+          <a:chExt cx="0" cy="0"/>
+        </a:xfrm>
+      </p:grpSpPr>
+      <p:sp>
+        <p:nvSpPr>
+          <p:cNvPr id="2" name="標題 1">
+            <a:extLst>
+              <a:ext uri="{FF2B5EF4-FFF2-40B4-BE49-F238E27FC236}">
+                <a16:creationId xmlns:a16="http://schemas.microsoft.com/office/drawing/2014/main" id="{60856E43-3621-4F02-B0E9-EF43423F3E70}"/>
+              </a:ext>
+            </a:extLst>
+          </p:cNvPr>
+          <p:cNvSpPr>
+            <a:spLocks noGrp="1"/>
+          </p:cNvSpPr>
+          <p:nvPr>
+            <p:ph type="title"/>
+          </p:nvPr>
+        </p:nvSpPr>
+        <p:spPr>
+          <a:xfrm>
+            <a:off x="1000979" y="740808"/>
+            <a:ext cx="10419907" cy="5082362"/>
+          </a:xfrm>
+        </p:spPr>
+        <p:txBody>
+          <a:bodyPr>
+            <a:normAutofit/>
+          </a:bodyPr>
+          <a:lstStyle/>
+          <a:p>
+            <a:r>
+              <a:rPr lang="en-US" altLang="zh-TW" sz="9600" dirty="0">
+                <a:solidFill>
+                  <a:schemeClr val="tx1"/>
+                </a:solidFill>
+                <a:latin typeface="微軟正黑體" panose="020B0604030504040204" pitchFamily="34" charset="-120"/>
+                <a:ea typeface="微軟正黑體" panose="020B0604030504040204" pitchFamily="34" charset="-120"/>
+              </a:rPr>
+              <a:t>3D</a:t>
+            </a:r>
+            <a:r>
+              <a:rPr lang="zh-TW" altLang="en-US" sz="9600" dirty="0">
+                <a:solidFill>
+                  <a:schemeClr val="tx1"/>
+                </a:solidFill>
+                <a:latin typeface="微軟正黑體" panose="020B0604030504040204" pitchFamily="34" charset="-120"/>
+                <a:ea typeface="微軟正黑體" panose="020B0604030504040204" pitchFamily="34" charset="-120"/>
+              </a:rPr>
+              <a:t>物體的</a:t>
+            </a:r>
+            <a:r>
+              <a:rPr lang="zh-TW" altLang="en-US" sz="9600" dirty="0">
+                <a:solidFill>
+                  <a:srgbClr val="FF0000"/>
+                </a:solidFill>
+                <a:latin typeface="微軟正黑體" panose="020B0604030504040204" pitchFamily="34" charset="-120"/>
+                <a:ea typeface="微軟正黑體" panose="020B0604030504040204" pitchFamily="34" charset="-120"/>
+              </a:rPr>
+              <a:t>親子關係</a:t>
+            </a:r>
+          </a:p>
+        </p:txBody>
+      </p:sp>
+    </p:spTree>
+    <p:extLst>
+      <p:ext uri="{BB962C8B-B14F-4D97-AF65-F5344CB8AC3E}">
+        <p14:creationId xmlns:p14="http://schemas.microsoft.com/office/powerpoint/2010/main" val="1669738922"/>
+      </p:ext>
+    </p:extLst>
+  </p:cSld>
+  <p:clrMapOvr>
+    <a:masterClrMapping/>
+  </p:clrMapOvr>
+  <p:timing>
+    <p:tnLst>
+      <p:par>
+        <p:cTn id="1" dur="indefinite" restart="never" nodeType="tmRoot">
+          <p:childTnLst>
+            <p:seq concurrent="1" nextAc="seek">
+              <p:cTn id="2" dur="indefinite" nodeType="mainSeq">
+                <p:childTnLst>
+                  <p:par>
+                    <p:cTn id="3" fill="hold">
+                      <p:stCondLst>
+                        <p:cond delay="indefinite"/>
+                        <p:cond evt="onBegin" delay="0">
+                          <p:tn val="2"/>
+                        </p:cond>
+                      </p:stCondLst>
+                      <p:childTnLst>
+                        <p:par>
+                          <p:cTn id="4" fill="hold">
+                            <p:stCondLst>
+                              <p:cond delay="0"/>
+                            </p:stCondLst>
+                            <p:childTnLst>
+                              <p:par>
+                                <p:cTn id="5" presetID="22" presetClass="entr" presetSubtype="4" fill="hold" grpId="0" nodeType="afterEffect">
+                                  <p:stCondLst>
+                                    <p:cond delay="0"/>
+                                  </p:stCondLst>
+                                  <p:iterate type="lt">
+                                    <p:tmPct val="100000"/>
+                                  </p:iterate>
+                                  <p:childTnLst>
+                                    <p:set>
+                                      <p:cBhvr>
+                                        <p:cTn id="6" dur="1" fill="hold">
+                                          <p:stCondLst>
+                                            <p:cond delay="0"/>
+                                          </p:stCondLst>
+                                        </p:cTn>
+                                        <p:tgtEl>
+                                          <p:spTgt spid="2"/>
+                                        </p:tgtEl>
+                                        <p:attrNameLst>
+                                          <p:attrName>style.visibility</p:attrName>
+                                        </p:attrNameLst>
+                                      </p:cBhvr>
+                                      <p:to>
+                                        <p:strVal val="visible"/>
+                                      </p:to>
+                                    </p:set>
+                                    <p:animEffect transition="in" filter="wipe(down)">
+                                      <p:cBhvr>
+                                        <p:cTn id="7" dur="250"/>
+                                        <p:tgtEl>
+                                          <p:spTgt spid="2"/>
+                                        </p:tgtEl>
+                                      </p:cBhvr>
+                                    </p:animEffect>
+                                  </p:childTnLst>
+                                </p:cTn>
+                              </p:par>
+                            </p:childTnLst>
+                          </p:cTn>
+                        </p:par>
+                      </p:childTnLst>
+                    </p:cTn>
+                  </p:par>
+                </p:childTnLst>
+              </p:cTn>
+              <p:prevCondLst>
+                <p:cond evt="onPrev" delay="0">
+                  <p:tgtEl>
+                    <p:sldTgt/>
+                  </p:tgtEl>
+                </p:cond>
+              </p:prevCondLst>
+              <p:nextCondLst>
+                <p:cond evt="onNext" delay="0">
+                  <p:tgtEl>
+                    <p:sldTgt/>
+                  </p:tgtEl>
+                </p:cond>
+              </p:nextCondLst>
+            </p:seq>
+          </p:childTnLst>
+        </p:cTn>
+      </p:par>
+    </p:tnLst>
+    <p:bldLst>
+      <p:bldP spid="2" grpId="0"/>
+    </p:bldLst>
+  </p:timing>
+</p:sld>
+</file>
+
+<file path=ppt/slides/slide22.xml><?xml version="1.0" encoding="utf-8"?>
+<p:sld xmlns:a="http://schemas.openxmlformats.org/drawingml/2006/main" xmlns:r="http://schemas.openxmlformats.org/officeDocument/2006/relationships" xmlns:p="http://schemas.openxmlformats.org/presentationml/2006/main">
+  <p:cSld>
+    <p:spTree>
+      <p:nvGrpSpPr>
+        <p:cNvPr id="1" name=""/>
+        <p:cNvGrpSpPr/>
+        <p:nvPr/>
+      </p:nvGrpSpPr>
+      <p:grpSpPr>
+        <a:xfrm>
+          <a:off x="0" y="0"/>
+          <a:ext cx="0" cy="0"/>
+          <a:chOff x="0" y="0"/>
+          <a:chExt cx="0" cy="0"/>
+        </a:xfrm>
+      </p:grpSpPr>
+      <p:sp>
+        <p:nvSpPr>
+          <p:cNvPr id="2" name="標題 1">
+            <a:extLst>
+              <a:ext uri="{FF2B5EF4-FFF2-40B4-BE49-F238E27FC236}">
+                <a16:creationId xmlns:a16="http://schemas.microsoft.com/office/drawing/2014/main" id="{60856E43-3621-4F02-B0E9-EF43423F3E70}"/>
+              </a:ext>
+            </a:extLst>
+          </p:cNvPr>
+          <p:cNvSpPr>
+            <a:spLocks noGrp="1"/>
+          </p:cNvSpPr>
+          <p:nvPr>
+            <p:ph type="title"/>
+          </p:nvPr>
+        </p:nvSpPr>
+        <p:spPr>
+          <a:xfrm>
+            <a:off x="1000979" y="740808"/>
+            <a:ext cx="10419907" cy="5082362"/>
+          </a:xfrm>
+        </p:spPr>
+        <p:txBody>
+          <a:bodyPr>
+            <a:normAutofit/>
+          </a:bodyPr>
+          <a:lstStyle/>
+          <a:p>
+            <a:r>
+              <a:rPr lang="zh-TW" altLang="en-US" sz="9600" dirty="0">
+                <a:solidFill>
+                  <a:schemeClr val="tx1"/>
+                </a:solidFill>
+                <a:latin typeface="微軟正黑體" panose="020B0604030504040204" pitchFamily="34" charset="-120"/>
+                <a:ea typeface="微軟正黑體" panose="020B0604030504040204" pitchFamily="34" charset="-120"/>
+              </a:rPr>
+              <a:t>建立</a:t>
+            </a:r>
+            <a:r>
+              <a:rPr lang="zh-TW" altLang="en-US" sz="9600" dirty="0">
+                <a:solidFill>
+                  <a:srgbClr val="FF0000"/>
+                </a:solidFill>
+                <a:latin typeface="微軟正黑體" panose="020B0604030504040204" pitchFamily="34" charset="-120"/>
+                <a:ea typeface="微軟正黑體" panose="020B0604030504040204" pitchFamily="34" charset="-120"/>
+              </a:rPr>
+              <a:t>親子關係</a:t>
+            </a:r>
+            <a:br>
+              <a:rPr lang="en-US" altLang="zh-TW" sz="9600" dirty="0">
+                <a:solidFill>
+                  <a:srgbClr val="FF0000"/>
+                </a:solidFill>
+                <a:latin typeface="微軟正黑體" panose="020B0604030504040204" pitchFamily="34" charset="-120"/>
+                <a:ea typeface="微軟正黑體" panose="020B0604030504040204" pitchFamily="34" charset="-120"/>
+              </a:rPr>
+            </a:br>
+            <a:r>
+              <a:rPr lang="zh-TW" altLang="en-US" sz="8800" dirty="0">
+                <a:solidFill>
+                  <a:schemeClr val="tx1"/>
+                </a:solidFill>
+                <a:latin typeface="微軟正黑體" panose="020B0604030504040204" pitchFamily="34" charset="-120"/>
+                <a:ea typeface="微軟正黑體" panose="020B0604030504040204" pitchFamily="34" charset="-120"/>
+              </a:rPr>
+              <a:t>地球的</a:t>
+            </a:r>
+            <a:r>
+              <a:rPr lang="zh-TW" altLang="en-US" sz="8800" dirty="0">
+                <a:solidFill>
+                  <a:srgbClr val="FF0000"/>
+                </a:solidFill>
+                <a:latin typeface="微軟正黑體" panose="020B0604030504040204" pitchFamily="34" charset="-120"/>
+                <a:ea typeface="微軟正黑體" panose="020B0604030504040204" pitchFamily="34" charset="-120"/>
+              </a:rPr>
+              <a:t>親代</a:t>
+            </a:r>
+            <a:r>
+              <a:rPr lang="zh-TW" altLang="en-US" sz="8800" dirty="0">
+                <a:solidFill>
+                  <a:schemeClr val="tx1"/>
+                </a:solidFill>
+                <a:latin typeface="微軟正黑體" panose="020B0604030504040204" pitchFamily="34" charset="-120"/>
+                <a:ea typeface="微軟正黑體" panose="020B0604030504040204" pitchFamily="34" charset="-120"/>
+              </a:rPr>
+              <a:t>是自轉軸</a:t>
+            </a:r>
+            <a:endParaRPr lang="zh-TW" altLang="en-US" sz="9600" dirty="0">
+              <a:solidFill>
+                <a:schemeClr val="tx1"/>
+              </a:solidFill>
+              <a:latin typeface="微軟正黑體" panose="020B0604030504040204" pitchFamily="34" charset="-120"/>
+              <a:ea typeface="微軟正黑體" panose="020B0604030504040204" pitchFamily="34" charset="-120"/>
+            </a:endParaRPr>
+          </a:p>
+        </p:txBody>
+      </p:sp>
+    </p:spTree>
+    <p:extLst>
+      <p:ext uri="{BB962C8B-B14F-4D97-AF65-F5344CB8AC3E}">
+        <p14:creationId xmlns:p14="http://schemas.microsoft.com/office/powerpoint/2010/main" val="1820783169"/>
+      </p:ext>
+    </p:extLst>
+  </p:cSld>
+  <p:clrMapOvr>
+    <a:masterClrMapping/>
+  </p:clrMapOvr>
+  <p:timing>
+    <p:tnLst>
+      <p:par>
+        <p:cTn id="1" dur="indefinite" restart="never" nodeType="tmRoot">
+          <p:childTnLst>
+            <p:seq concurrent="1" nextAc="seek">
+              <p:cTn id="2" dur="indefinite" nodeType="mainSeq">
+                <p:childTnLst>
+                  <p:par>
+                    <p:cTn id="3" fill="hold">
+                      <p:stCondLst>
+                        <p:cond delay="indefinite"/>
+                        <p:cond evt="onBegin" delay="0">
+                          <p:tn val="2"/>
+                        </p:cond>
+                      </p:stCondLst>
+                      <p:childTnLst>
+                        <p:par>
+                          <p:cTn id="4" fill="hold">
+                            <p:stCondLst>
+                              <p:cond delay="0"/>
+                            </p:stCondLst>
+                            <p:childTnLst>
+                              <p:par>
+                                <p:cTn id="5" presetID="22" presetClass="entr" presetSubtype="4" fill="hold" grpId="0" nodeType="afterEffect">
+                                  <p:stCondLst>
+                                    <p:cond delay="0"/>
+                                  </p:stCondLst>
+                                  <p:iterate type="lt">
+                                    <p:tmPct val="100000"/>
+                                  </p:iterate>
+                                  <p:childTnLst>
+                                    <p:set>
+                                      <p:cBhvr>
+                                        <p:cTn id="6" dur="1" fill="hold">
+                                          <p:stCondLst>
+                                            <p:cond delay="0"/>
+                                          </p:stCondLst>
+                                        </p:cTn>
+                                        <p:tgtEl>
+                                          <p:spTgt spid="2"/>
+                                        </p:tgtEl>
+                                        <p:attrNameLst>
+                                          <p:attrName>style.visibility</p:attrName>
+                                        </p:attrNameLst>
+                                      </p:cBhvr>
+                                      <p:to>
+                                        <p:strVal val="visible"/>
+                                      </p:to>
+                                    </p:set>
+                                    <p:animEffect transition="in" filter="wipe(down)">
+                                      <p:cBhvr>
+                                        <p:cTn id="7" dur="250"/>
+                                        <p:tgtEl>
+                                          <p:spTgt spid="2"/>
+                                        </p:tgtEl>
+                                      </p:cBhvr>
+                                    </p:animEffect>
+                                  </p:childTnLst>
+                                </p:cTn>
+                              </p:par>
+                            </p:childTnLst>
+                          </p:cTn>
+                        </p:par>
+                      </p:childTnLst>
+                    </p:cTn>
+                  </p:par>
+                </p:childTnLst>
+              </p:cTn>
+              <p:prevCondLst>
+                <p:cond evt="onPrev" delay="0">
+                  <p:tgtEl>
+                    <p:sldTgt/>
+                  </p:tgtEl>
+                </p:cond>
+              </p:prevCondLst>
+              <p:nextCondLst>
+                <p:cond evt="onNext" delay="0">
+                  <p:tgtEl>
+                    <p:sldTgt/>
+                  </p:tgtEl>
+                </p:cond>
+              </p:nextCondLst>
+            </p:seq>
+          </p:childTnLst>
+        </p:cTn>
+      </p:par>
+    </p:tnLst>
+    <p:bldLst>
+      <p:bldP spid="2" grpId="0"/>
+    </p:bldLst>
+  </p:timing>
+</p:sld>
+</file>
+
+<file path=ppt/slides/slide23.xml><?xml version="1.0" encoding="utf-8"?>
+<p:sld xmlns:a="http://schemas.openxmlformats.org/drawingml/2006/main" xmlns:r="http://schemas.openxmlformats.org/officeDocument/2006/relationships" xmlns:p="http://schemas.openxmlformats.org/presentationml/2006/main">
+  <p:cSld>
+    <p:spTree>
+      <p:nvGrpSpPr>
+        <p:cNvPr id="1" name=""/>
+        <p:cNvGrpSpPr/>
+        <p:nvPr/>
+      </p:nvGrpSpPr>
+      <p:grpSpPr>
+        <a:xfrm>
+          <a:off x="0" y="0"/>
+          <a:ext cx="0" cy="0"/>
+          <a:chOff x="0" y="0"/>
+          <a:chExt cx="0" cy="0"/>
+        </a:xfrm>
+      </p:grpSpPr>
+      <p:sp>
+        <p:nvSpPr>
+          <p:cNvPr id="2" name="標題 1">
+            <a:extLst>
+              <a:ext uri="{FF2B5EF4-FFF2-40B4-BE49-F238E27FC236}">
+                <a16:creationId xmlns:a16="http://schemas.microsoft.com/office/drawing/2014/main" id="{E39515FA-8C05-415A-9171-15D6B608FF2D}"/>
+              </a:ext>
+            </a:extLst>
+          </p:cNvPr>
+          <p:cNvSpPr>
+            <a:spLocks noGrp="1"/>
+          </p:cNvSpPr>
+          <p:nvPr>
+            <p:ph type="ctrTitle"/>
+          </p:nvPr>
+        </p:nvSpPr>
+        <p:spPr>
+          <a:xfrm>
+            <a:off x="2688165" y="2671233"/>
+            <a:ext cx="6815669" cy="1515533"/>
+          </a:xfrm>
+        </p:spPr>
+        <p:txBody>
+          <a:bodyPr/>
+          <a:lstStyle/>
+          <a:p>
+            <a:r>
+              <a:rPr lang="zh-TW" altLang="en-US" sz="9600" dirty="0">
+                <a:latin typeface="Berlin Sans FB" panose="020E0602020502020306" pitchFamily="34" charset="0"/>
+                <a:ea typeface="微軟正黑體 Light" panose="020B0304030504040204" pitchFamily="34" charset="-120"/>
+              </a:rPr>
+              <a:t>程式完成</a:t>
+            </a:r>
+          </a:p>
+        </p:txBody>
+      </p:sp>
+    </p:spTree>
+    <p:extLst>
+      <p:ext uri="{BB962C8B-B14F-4D97-AF65-F5344CB8AC3E}">
+        <p14:creationId xmlns:p14="http://schemas.microsoft.com/office/powerpoint/2010/main" val="2727996506"/>
+      </p:ext>
+    </p:extLst>
+  </p:cSld>
+  <p:clrMapOvr>
+    <a:masterClrMapping/>
+  </p:clrMapOvr>
+  <p:timing>
+    <p:tnLst>
+      <p:par>
+        <p:cTn id="1" dur="indefinite" restart="never" nodeType="tmRoot">
+          <p:childTnLst>
+            <p:seq concurrent="1" nextAc="seek">
+              <p:cTn id="2" dur="indefinite" nodeType="mainSeq">
+                <p:childTnLst>
+                  <p:par>
+                    <p:cTn id="3" fill="hold">
+                      <p:stCondLst>
+                        <p:cond delay="indefinite"/>
+                        <p:cond evt="onBegin" delay="0">
+                          <p:tn val="2"/>
+                        </p:cond>
+                      </p:stCondLst>
+                      <p:childTnLst>
+                        <p:par>
+                          <p:cTn id="4" fill="hold">
+                            <p:stCondLst>
+                              <p:cond delay="0"/>
+                            </p:stCondLst>
+                            <p:childTnLst>
+                              <p:par>
+                                <p:cTn id="5" presetID="22" presetClass="entr" presetSubtype="4" fill="hold" grpId="0" nodeType="afterEffect">
+                                  <p:stCondLst>
+                                    <p:cond delay="0"/>
+                                  </p:stCondLst>
+                                  <p:iterate type="lt">
+                                    <p:tmPct val="100000"/>
+                                  </p:iterate>
+                                  <p:childTnLst>
+                                    <p:set>
+                                      <p:cBhvr>
+                                        <p:cTn id="6" dur="1" fill="hold">
+                                          <p:stCondLst>
+                                            <p:cond delay="0"/>
+                                          </p:stCondLst>
+                                        </p:cTn>
+                                        <p:tgtEl>
+                                          <p:spTgt spid="2"/>
+                                        </p:tgtEl>
+                                        <p:attrNameLst>
+                                          <p:attrName>style.visibility</p:attrName>
+                                        </p:attrNameLst>
+                                      </p:cBhvr>
+                                      <p:to>
+                                        <p:strVal val="visible"/>
+                                      </p:to>
+                                    </p:set>
+                                    <p:animEffect transition="in" filter="wipe(down)">
+                                      <p:cBhvr>
+                                        <p:cTn id="7" dur="250"/>
                                         <p:tgtEl>
                                           <p:spTgt spid="2"/>
                                         </p:tgtEl>
@@ -8517,598 +9210,6 @@
       </p:grpSpPr>
       <p:sp>
         <p:nvSpPr>
-          <p:cNvPr id="4" name="標題 1">
-            <a:extLst>
-              <a:ext uri="{FF2B5EF4-FFF2-40B4-BE49-F238E27FC236}">
-                <a16:creationId xmlns:a16="http://schemas.microsoft.com/office/drawing/2014/main" id="{9EADEA97-424F-499B-A6C4-A6DCEE800E72}"/>
-              </a:ext>
-            </a:extLst>
-          </p:cNvPr>
-          <p:cNvSpPr txBox="1">
-            <a:spLocks/>
-          </p:cNvSpPr>
-          <p:nvPr/>
-        </p:nvSpPr>
-        <p:spPr>
-          <a:xfrm>
-            <a:off x="2762810" y="2671233"/>
-            <a:ext cx="6815669" cy="1515533"/>
-          </a:xfrm>
-          <a:prstGeom prst="rect">
-            <a:avLst/>
-          </a:prstGeom>
-          <a:effectLst/>
-        </p:spPr>
-        <p:txBody>
-          <a:bodyPr vert="horz" lIns="91440" tIns="45720" rIns="91440" bIns="45720" rtlCol="0" anchor="b">
-            <a:noAutofit/>
-          </a:bodyPr>
-          <a:lstStyle>
-            <a:lvl1pPr algn="ctr" defTabSz="457200" rtl="0" eaLnBrk="1" latinLnBrk="0" hangingPunct="1">
-              <a:spcBef>
-                <a:spcPct val="0"/>
-              </a:spcBef>
-              <a:buNone/>
-              <a:defRPr sz="5400" kern="1200" cap="none">
-                <a:ln w="3175" cmpd="sng">
-                  <a:noFill/>
-                </a:ln>
-                <a:solidFill>
-                  <a:schemeClr val="tx1">
-                    <a:lumMod val="85000"/>
-                    <a:lumOff val="15000"/>
-                  </a:schemeClr>
-                </a:solidFill>
-                <a:effectLst/>
-                <a:latin typeface="+mj-lt"/>
-                <a:ea typeface="+mj-ea"/>
-                <a:cs typeface="+mj-cs"/>
-              </a:defRPr>
-            </a:lvl1pPr>
-            <a:lvl2pPr eaLnBrk="1" hangingPunct="1">
-              <a:defRPr>
-                <a:solidFill>
-                  <a:schemeClr val="tx2"/>
-                </a:solidFill>
-              </a:defRPr>
-            </a:lvl2pPr>
-            <a:lvl3pPr eaLnBrk="1" hangingPunct="1">
-              <a:defRPr>
-                <a:solidFill>
-                  <a:schemeClr val="tx2"/>
-                </a:solidFill>
-              </a:defRPr>
-            </a:lvl3pPr>
-            <a:lvl4pPr eaLnBrk="1" hangingPunct="1">
-              <a:defRPr>
-                <a:solidFill>
-                  <a:schemeClr val="tx2"/>
-                </a:solidFill>
-              </a:defRPr>
-            </a:lvl4pPr>
-            <a:lvl5pPr eaLnBrk="1" hangingPunct="1">
-              <a:defRPr>
-                <a:solidFill>
-                  <a:schemeClr val="tx2"/>
-                </a:solidFill>
-              </a:defRPr>
-            </a:lvl5pPr>
-            <a:lvl6pPr eaLnBrk="1" hangingPunct="1">
-              <a:defRPr>
-                <a:solidFill>
-                  <a:schemeClr val="tx2"/>
-                </a:solidFill>
-              </a:defRPr>
-            </a:lvl6pPr>
-            <a:lvl7pPr eaLnBrk="1" hangingPunct="1">
-              <a:defRPr>
-                <a:solidFill>
-                  <a:schemeClr val="tx2"/>
-                </a:solidFill>
-              </a:defRPr>
-            </a:lvl7pPr>
-            <a:lvl8pPr eaLnBrk="1" hangingPunct="1">
-              <a:defRPr>
-                <a:solidFill>
-                  <a:schemeClr val="tx2"/>
-                </a:solidFill>
-              </a:defRPr>
-            </a:lvl8pPr>
-            <a:lvl9pPr eaLnBrk="1" hangingPunct="1">
-              <a:defRPr>
-                <a:solidFill>
-                  <a:schemeClr val="tx2"/>
-                </a:solidFill>
-              </a:defRPr>
-            </a:lvl9pPr>
-          </a:lstStyle>
-          <a:p>
-            <a:r>
-              <a:rPr lang="zh-TW" altLang="en-US" sz="8000" dirty="0">
-                <a:latin typeface="Berlin Sans FB" panose="020E0602020502020306" pitchFamily="34" charset="0"/>
-                <a:ea typeface="微軟正黑體 Light" panose="020B0304030504040204" pitchFamily="34" charset="-120"/>
-              </a:rPr>
-              <a:t>標示轉動方向</a:t>
-            </a:r>
-          </a:p>
-        </p:txBody>
-      </p:sp>
-    </p:spTree>
-    <p:extLst>
-      <p:ext uri="{BB962C8B-B14F-4D97-AF65-F5344CB8AC3E}">
-        <p14:creationId xmlns:p14="http://schemas.microsoft.com/office/powerpoint/2010/main" val="1811370539"/>
-      </p:ext>
-    </p:extLst>
-  </p:cSld>
-  <p:clrMapOvr>
-    <a:masterClrMapping/>
-  </p:clrMapOvr>
-</p:sld>
-</file>
-
-<file path=ppt/slides/slide6.xml><?xml version="1.0" encoding="utf-8"?>
-<p:sld xmlns:a="http://schemas.openxmlformats.org/drawingml/2006/main" xmlns:r="http://schemas.openxmlformats.org/officeDocument/2006/relationships" xmlns:p="http://schemas.openxmlformats.org/presentationml/2006/main">
-  <p:cSld>
-    <p:spTree>
-      <p:nvGrpSpPr>
-        <p:cNvPr id="1" name=""/>
-        <p:cNvGrpSpPr/>
-        <p:nvPr/>
-      </p:nvGrpSpPr>
-      <p:grpSpPr>
-        <a:xfrm>
-          <a:off x="0" y="0"/>
-          <a:ext cx="0" cy="0"/>
-          <a:chOff x="0" y="0"/>
-          <a:chExt cx="0" cy="0"/>
-        </a:xfrm>
-      </p:grpSpPr>
-      <p:sp>
-        <p:nvSpPr>
-          <p:cNvPr id="4" name="標題 1">
-            <a:extLst>
-              <a:ext uri="{FF2B5EF4-FFF2-40B4-BE49-F238E27FC236}">
-                <a16:creationId xmlns:a16="http://schemas.microsoft.com/office/drawing/2014/main" id="{9EADEA97-424F-499B-A6C4-A6DCEE800E72}"/>
-              </a:ext>
-            </a:extLst>
-          </p:cNvPr>
-          <p:cNvSpPr txBox="1">
-            <a:spLocks/>
-          </p:cNvSpPr>
-          <p:nvPr/>
-        </p:nvSpPr>
-        <p:spPr>
-          <a:xfrm>
-            <a:off x="2762810" y="2671233"/>
-            <a:ext cx="6815669" cy="1515533"/>
-          </a:xfrm>
-          <a:prstGeom prst="rect">
-            <a:avLst/>
-          </a:prstGeom>
-          <a:effectLst/>
-        </p:spPr>
-        <p:txBody>
-          <a:bodyPr vert="horz" lIns="91440" tIns="45720" rIns="91440" bIns="45720" rtlCol="0" anchor="b">
-            <a:noAutofit/>
-          </a:bodyPr>
-          <a:lstStyle>
-            <a:lvl1pPr algn="ctr" defTabSz="457200" rtl="0" eaLnBrk="1" latinLnBrk="0" hangingPunct="1">
-              <a:spcBef>
-                <a:spcPct val="0"/>
-              </a:spcBef>
-              <a:buNone/>
-              <a:defRPr sz="5400" kern="1200" cap="none">
-                <a:ln w="3175" cmpd="sng">
-                  <a:noFill/>
-                </a:ln>
-                <a:solidFill>
-                  <a:schemeClr val="tx1">
-                    <a:lumMod val="85000"/>
-                    <a:lumOff val="15000"/>
-                  </a:schemeClr>
-                </a:solidFill>
-                <a:effectLst/>
-                <a:latin typeface="+mj-lt"/>
-                <a:ea typeface="+mj-ea"/>
-                <a:cs typeface="+mj-cs"/>
-              </a:defRPr>
-            </a:lvl1pPr>
-            <a:lvl2pPr eaLnBrk="1" hangingPunct="1">
-              <a:defRPr>
-                <a:solidFill>
-                  <a:schemeClr val="tx2"/>
-                </a:solidFill>
-              </a:defRPr>
-            </a:lvl2pPr>
-            <a:lvl3pPr eaLnBrk="1" hangingPunct="1">
-              <a:defRPr>
-                <a:solidFill>
-                  <a:schemeClr val="tx2"/>
-                </a:solidFill>
-              </a:defRPr>
-            </a:lvl3pPr>
-            <a:lvl4pPr eaLnBrk="1" hangingPunct="1">
-              <a:defRPr>
-                <a:solidFill>
-                  <a:schemeClr val="tx2"/>
-                </a:solidFill>
-              </a:defRPr>
-            </a:lvl4pPr>
-            <a:lvl5pPr eaLnBrk="1" hangingPunct="1">
-              <a:defRPr>
-                <a:solidFill>
-                  <a:schemeClr val="tx2"/>
-                </a:solidFill>
-              </a:defRPr>
-            </a:lvl5pPr>
-            <a:lvl6pPr eaLnBrk="1" hangingPunct="1">
-              <a:defRPr>
-                <a:solidFill>
-                  <a:schemeClr val="tx2"/>
-                </a:solidFill>
-              </a:defRPr>
-            </a:lvl6pPr>
-            <a:lvl7pPr eaLnBrk="1" hangingPunct="1">
-              <a:defRPr>
-                <a:solidFill>
-                  <a:schemeClr val="tx2"/>
-                </a:solidFill>
-              </a:defRPr>
-            </a:lvl7pPr>
-            <a:lvl8pPr eaLnBrk="1" hangingPunct="1">
-              <a:defRPr>
-                <a:solidFill>
-                  <a:schemeClr val="tx2"/>
-                </a:solidFill>
-              </a:defRPr>
-            </a:lvl8pPr>
-            <a:lvl9pPr eaLnBrk="1" hangingPunct="1">
-              <a:defRPr>
-                <a:solidFill>
-                  <a:schemeClr val="tx2"/>
-                </a:solidFill>
-              </a:defRPr>
-            </a:lvl9pPr>
-          </a:lstStyle>
-          <a:p>
-            <a:r>
-              <a:rPr lang="zh-TW" altLang="en-US" sz="8000" dirty="0">
-                <a:latin typeface="Berlin Sans FB" panose="020E0602020502020306" pitchFamily="34" charset="0"/>
-                <a:ea typeface="微軟正黑體 Light" panose="020B0304030504040204" pitchFamily="34" charset="-120"/>
-              </a:rPr>
-              <a:t>地球自轉</a:t>
-            </a:r>
-          </a:p>
-        </p:txBody>
-      </p:sp>
-    </p:spTree>
-    <p:extLst>
-      <p:ext uri="{BB962C8B-B14F-4D97-AF65-F5344CB8AC3E}">
-        <p14:creationId xmlns:p14="http://schemas.microsoft.com/office/powerpoint/2010/main" val="3080278468"/>
-      </p:ext>
-    </p:extLst>
-  </p:cSld>
-  <p:clrMapOvr>
-    <a:masterClrMapping/>
-  </p:clrMapOvr>
-</p:sld>
-</file>
-
-<file path=ppt/slides/slide7.xml><?xml version="1.0" encoding="utf-8"?>
-<p:sld xmlns:a="http://schemas.openxmlformats.org/drawingml/2006/main" xmlns:r="http://schemas.openxmlformats.org/officeDocument/2006/relationships" xmlns:p="http://schemas.openxmlformats.org/presentationml/2006/main">
-  <p:cSld>
-    <p:spTree>
-      <p:nvGrpSpPr>
-        <p:cNvPr id="1" name=""/>
-        <p:cNvGrpSpPr/>
-        <p:nvPr/>
-      </p:nvGrpSpPr>
-      <p:grpSpPr>
-        <a:xfrm>
-          <a:off x="0" y="0"/>
-          <a:ext cx="0" cy="0"/>
-          <a:chOff x="0" y="0"/>
-          <a:chExt cx="0" cy="0"/>
-        </a:xfrm>
-      </p:grpSpPr>
-      <p:sp>
-        <p:nvSpPr>
-          <p:cNvPr id="4" name="標題 1">
-            <a:extLst>
-              <a:ext uri="{FF2B5EF4-FFF2-40B4-BE49-F238E27FC236}">
-                <a16:creationId xmlns:a16="http://schemas.microsoft.com/office/drawing/2014/main" id="{9EADEA97-424F-499B-A6C4-A6DCEE800E72}"/>
-              </a:ext>
-            </a:extLst>
-          </p:cNvPr>
-          <p:cNvSpPr txBox="1">
-            <a:spLocks/>
-          </p:cNvSpPr>
-          <p:nvPr/>
-        </p:nvSpPr>
-        <p:spPr>
-          <a:xfrm>
-            <a:off x="2762810" y="2671233"/>
-            <a:ext cx="6815669" cy="1515533"/>
-          </a:xfrm>
-          <a:prstGeom prst="rect">
-            <a:avLst/>
-          </a:prstGeom>
-          <a:effectLst/>
-        </p:spPr>
-        <p:txBody>
-          <a:bodyPr vert="horz" lIns="91440" tIns="45720" rIns="91440" bIns="45720" rtlCol="0" anchor="b">
-            <a:noAutofit/>
-          </a:bodyPr>
-          <a:lstStyle>
-            <a:lvl1pPr algn="ctr" defTabSz="457200" rtl="0" eaLnBrk="1" latinLnBrk="0" hangingPunct="1">
-              <a:spcBef>
-                <a:spcPct val="0"/>
-              </a:spcBef>
-              <a:buNone/>
-              <a:defRPr sz="5400" kern="1200" cap="none">
-                <a:ln w="3175" cmpd="sng">
-                  <a:noFill/>
-                </a:ln>
-                <a:solidFill>
-                  <a:schemeClr val="tx1">
-                    <a:lumMod val="85000"/>
-                    <a:lumOff val="15000"/>
-                  </a:schemeClr>
-                </a:solidFill>
-                <a:effectLst/>
-                <a:latin typeface="+mj-lt"/>
-                <a:ea typeface="+mj-ea"/>
-                <a:cs typeface="+mj-cs"/>
-              </a:defRPr>
-            </a:lvl1pPr>
-            <a:lvl2pPr eaLnBrk="1" hangingPunct="1">
-              <a:defRPr>
-                <a:solidFill>
-                  <a:schemeClr val="tx2"/>
-                </a:solidFill>
-              </a:defRPr>
-            </a:lvl2pPr>
-            <a:lvl3pPr eaLnBrk="1" hangingPunct="1">
-              <a:defRPr>
-                <a:solidFill>
-                  <a:schemeClr val="tx2"/>
-                </a:solidFill>
-              </a:defRPr>
-            </a:lvl3pPr>
-            <a:lvl4pPr eaLnBrk="1" hangingPunct="1">
-              <a:defRPr>
-                <a:solidFill>
-                  <a:schemeClr val="tx2"/>
-                </a:solidFill>
-              </a:defRPr>
-            </a:lvl4pPr>
-            <a:lvl5pPr eaLnBrk="1" hangingPunct="1">
-              <a:defRPr>
-                <a:solidFill>
-                  <a:schemeClr val="tx2"/>
-                </a:solidFill>
-              </a:defRPr>
-            </a:lvl5pPr>
-            <a:lvl6pPr eaLnBrk="1" hangingPunct="1">
-              <a:defRPr>
-                <a:solidFill>
-                  <a:schemeClr val="tx2"/>
-                </a:solidFill>
-              </a:defRPr>
-            </a:lvl6pPr>
-            <a:lvl7pPr eaLnBrk="1" hangingPunct="1">
-              <a:defRPr>
-                <a:solidFill>
-                  <a:schemeClr val="tx2"/>
-                </a:solidFill>
-              </a:defRPr>
-            </a:lvl7pPr>
-            <a:lvl8pPr eaLnBrk="1" hangingPunct="1">
-              <a:defRPr>
-                <a:solidFill>
-                  <a:schemeClr val="tx2"/>
-                </a:solidFill>
-              </a:defRPr>
-            </a:lvl8pPr>
-            <a:lvl9pPr eaLnBrk="1" hangingPunct="1">
-              <a:defRPr>
-                <a:solidFill>
-                  <a:schemeClr val="tx2"/>
-                </a:solidFill>
-              </a:defRPr>
-            </a:lvl9pPr>
-          </a:lstStyle>
-          <a:p>
-            <a:r>
-              <a:rPr lang="zh-TW" altLang="en-US" sz="8000" dirty="0">
-                <a:latin typeface="Berlin Sans FB" panose="020E0602020502020306" pitchFamily="34" charset="0"/>
-                <a:ea typeface="微軟正黑體 Light" panose="020B0304030504040204" pitchFamily="34" charset="-120"/>
-              </a:rPr>
-              <a:t>自轉軸傾斜</a:t>
-            </a:r>
-          </a:p>
-        </p:txBody>
-      </p:sp>
-    </p:spTree>
-    <p:extLst>
-      <p:ext uri="{BB962C8B-B14F-4D97-AF65-F5344CB8AC3E}">
-        <p14:creationId xmlns:p14="http://schemas.microsoft.com/office/powerpoint/2010/main" val="4056007138"/>
-      </p:ext>
-    </p:extLst>
-  </p:cSld>
-  <p:clrMapOvr>
-    <a:masterClrMapping/>
-  </p:clrMapOvr>
-</p:sld>
-</file>
-
-<file path=ppt/slides/slide8.xml><?xml version="1.0" encoding="utf-8"?>
-<p:sld xmlns:a="http://schemas.openxmlformats.org/drawingml/2006/main" xmlns:r="http://schemas.openxmlformats.org/officeDocument/2006/relationships" xmlns:p="http://schemas.openxmlformats.org/presentationml/2006/main">
-  <p:cSld>
-    <p:spTree>
-      <p:nvGrpSpPr>
-        <p:cNvPr id="1" name=""/>
-        <p:cNvGrpSpPr/>
-        <p:nvPr/>
-      </p:nvGrpSpPr>
-      <p:grpSpPr>
-        <a:xfrm>
-          <a:off x="0" y="0"/>
-          <a:ext cx="0" cy="0"/>
-          <a:chOff x="0" y="0"/>
-          <a:chExt cx="0" cy="0"/>
-        </a:xfrm>
-      </p:grpSpPr>
-      <p:sp>
-        <p:nvSpPr>
-          <p:cNvPr id="4" name="標題 1">
-            <a:extLst>
-              <a:ext uri="{FF2B5EF4-FFF2-40B4-BE49-F238E27FC236}">
-                <a16:creationId xmlns:a16="http://schemas.microsoft.com/office/drawing/2014/main" id="{9EADEA97-424F-499B-A6C4-A6DCEE800E72}"/>
-              </a:ext>
-            </a:extLst>
-          </p:cNvPr>
-          <p:cNvSpPr txBox="1">
-            <a:spLocks/>
-          </p:cNvSpPr>
-          <p:nvPr/>
-        </p:nvSpPr>
-        <p:spPr>
-          <a:xfrm>
-            <a:off x="2762810" y="2671233"/>
-            <a:ext cx="6815669" cy="1515533"/>
-          </a:xfrm>
-          <a:prstGeom prst="rect">
-            <a:avLst/>
-          </a:prstGeom>
-          <a:effectLst/>
-        </p:spPr>
-        <p:txBody>
-          <a:bodyPr vert="horz" lIns="91440" tIns="45720" rIns="91440" bIns="45720" rtlCol="0" anchor="b">
-            <a:noAutofit/>
-          </a:bodyPr>
-          <a:lstStyle>
-            <a:lvl1pPr algn="ctr" defTabSz="457200" rtl="0" eaLnBrk="1" latinLnBrk="0" hangingPunct="1">
-              <a:spcBef>
-                <a:spcPct val="0"/>
-              </a:spcBef>
-              <a:buNone/>
-              <a:defRPr sz="5400" kern="1200" cap="none">
-                <a:ln w="3175" cmpd="sng">
-                  <a:noFill/>
-                </a:ln>
-                <a:solidFill>
-                  <a:schemeClr val="tx1">
-                    <a:lumMod val="85000"/>
-                    <a:lumOff val="15000"/>
-                  </a:schemeClr>
-                </a:solidFill>
-                <a:effectLst/>
-                <a:latin typeface="+mj-lt"/>
-                <a:ea typeface="+mj-ea"/>
-                <a:cs typeface="+mj-cs"/>
-              </a:defRPr>
-            </a:lvl1pPr>
-            <a:lvl2pPr eaLnBrk="1" hangingPunct="1">
-              <a:defRPr>
-                <a:solidFill>
-                  <a:schemeClr val="tx2"/>
-                </a:solidFill>
-              </a:defRPr>
-            </a:lvl2pPr>
-            <a:lvl3pPr eaLnBrk="1" hangingPunct="1">
-              <a:defRPr>
-                <a:solidFill>
-                  <a:schemeClr val="tx2"/>
-                </a:solidFill>
-              </a:defRPr>
-            </a:lvl3pPr>
-            <a:lvl4pPr eaLnBrk="1" hangingPunct="1">
-              <a:defRPr>
-                <a:solidFill>
-                  <a:schemeClr val="tx2"/>
-                </a:solidFill>
-              </a:defRPr>
-            </a:lvl4pPr>
-            <a:lvl5pPr eaLnBrk="1" hangingPunct="1">
-              <a:defRPr>
-                <a:solidFill>
-                  <a:schemeClr val="tx2"/>
-                </a:solidFill>
-              </a:defRPr>
-            </a:lvl5pPr>
-            <a:lvl6pPr eaLnBrk="1" hangingPunct="1">
-              <a:defRPr>
-                <a:solidFill>
-                  <a:schemeClr val="tx2"/>
-                </a:solidFill>
-              </a:defRPr>
-            </a:lvl6pPr>
-            <a:lvl7pPr eaLnBrk="1" hangingPunct="1">
-              <a:defRPr>
-                <a:solidFill>
-                  <a:schemeClr val="tx2"/>
-                </a:solidFill>
-              </a:defRPr>
-            </a:lvl7pPr>
-            <a:lvl8pPr eaLnBrk="1" hangingPunct="1">
-              <a:defRPr>
-                <a:solidFill>
-                  <a:schemeClr val="tx2"/>
-                </a:solidFill>
-              </a:defRPr>
-            </a:lvl8pPr>
-            <a:lvl9pPr eaLnBrk="1" hangingPunct="1">
-              <a:defRPr>
-                <a:solidFill>
-                  <a:schemeClr val="tx2"/>
-                </a:solidFill>
-              </a:defRPr>
-            </a:lvl9pPr>
-          </a:lstStyle>
-          <a:p>
-            <a:r>
-              <a:rPr lang="zh-TW" altLang="en-US" sz="8000" dirty="0">
-                <a:latin typeface="Berlin Sans FB" panose="020E0602020502020306" pitchFamily="34" charset="0"/>
-                <a:ea typeface="微軟正黑體 Light" panose="020B0304030504040204" pitchFamily="34" charset="-120"/>
-              </a:rPr>
-              <a:t>地球傾斜</a:t>
-            </a:r>
-          </a:p>
-        </p:txBody>
-      </p:sp>
-    </p:spTree>
-    <p:extLst>
-      <p:ext uri="{BB962C8B-B14F-4D97-AF65-F5344CB8AC3E}">
-        <p14:creationId xmlns:p14="http://schemas.microsoft.com/office/powerpoint/2010/main" val="2073822058"/>
-      </p:ext>
-    </p:extLst>
-  </p:cSld>
-  <p:clrMapOvr>
-    <a:masterClrMapping/>
-  </p:clrMapOvr>
-</p:sld>
-</file>
-
-<file path=ppt/slides/slide9.xml><?xml version="1.0" encoding="utf-8"?>
-<p:sld xmlns:a="http://schemas.openxmlformats.org/drawingml/2006/main" xmlns:r="http://schemas.openxmlformats.org/officeDocument/2006/relationships" xmlns:p="http://schemas.openxmlformats.org/presentationml/2006/main">
-  <p:cSld>
-    <p:spTree>
-      <p:nvGrpSpPr>
-        <p:cNvPr id="1" name=""/>
-        <p:cNvGrpSpPr/>
-        <p:nvPr/>
-      </p:nvGrpSpPr>
-      <p:grpSpPr>
-        <a:xfrm>
-          <a:off x="0" y="0"/>
-          <a:ext cx="0" cy="0"/>
-          <a:chOff x="0" y="0"/>
-          <a:chExt cx="0" cy="0"/>
-        </a:xfrm>
-      </p:grpSpPr>
-      <p:sp>
-        <p:nvSpPr>
           <p:cNvPr id="2" name="標題 1">
             <a:extLst>
               <a:ext uri="{FF2B5EF4-FFF2-40B4-BE49-F238E27FC236}">
@@ -9148,15 +9249,22 @@
                 <a:latin typeface="微軟正黑體" panose="020B0604030504040204" pitchFamily="34" charset="-120"/>
                 <a:ea typeface="微軟正黑體" panose="020B0604030504040204" pitchFamily="34" charset="-120"/>
               </a:rPr>
-              <a:t>新增箭頭</a:t>
-            </a:r>
+              <a:t>新增球體</a:t>
+            </a:r>
+            <a:endParaRPr lang="zh-TW" altLang="en-US" sz="9600" dirty="0">
+              <a:solidFill>
+                <a:srgbClr val="FF0000"/>
+              </a:solidFill>
+              <a:latin typeface="微軟正黑體" panose="020B0604030504040204" pitchFamily="34" charset="-120"/>
+              <a:ea typeface="微軟正黑體" panose="020B0604030504040204" pitchFamily="34" charset="-120"/>
+            </a:endParaRPr>
           </a:p>
         </p:txBody>
       </p:sp>
     </p:spTree>
     <p:extLst>
       <p:ext uri="{BB962C8B-B14F-4D97-AF65-F5344CB8AC3E}">
-        <p14:creationId xmlns:p14="http://schemas.microsoft.com/office/powerpoint/2010/main" val="3170257582"/>
+        <p14:creationId xmlns:p14="http://schemas.microsoft.com/office/powerpoint/2010/main" val="1486264274"/>
       </p:ext>
     </p:extLst>
   </p:cSld>
@@ -9255,6 +9363,766 @@
       <p:bldP spid="2" grpId="0"/>
     </p:bldLst>
   </p:timing>
+</p:sld>
+</file>
+
+<file path=ppt/slides/slide6.xml><?xml version="1.0" encoding="utf-8"?>
+<p:sld xmlns:a="http://schemas.openxmlformats.org/drawingml/2006/main" xmlns:r="http://schemas.openxmlformats.org/officeDocument/2006/relationships" xmlns:p="http://schemas.openxmlformats.org/presentationml/2006/main">
+  <p:cSld>
+    <p:spTree>
+      <p:nvGrpSpPr>
+        <p:cNvPr id="1" name=""/>
+        <p:cNvGrpSpPr/>
+        <p:nvPr/>
+      </p:nvGrpSpPr>
+      <p:grpSpPr>
+        <a:xfrm>
+          <a:off x="0" y="0"/>
+          <a:ext cx="0" cy="0"/>
+          <a:chOff x="0" y="0"/>
+          <a:chExt cx="0" cy="0"/>
+        </a:xfrm>
+      </p:grpSpPr>
+      <p:sp>
+        <p:nvSpPr>
+          <p:cNvPr id="2" name="標題 1">
+            <a:extLst>
+              <a:ext uri="{FF2B5EF4-FFF2-40B4-BE49-F238E27FC236}">
+                <a16:creationId xmlns:a16="http://schemas.microsoft.com/office/drawing/2014/main" id="{60856E43-3621-4F02-B0E9-EF43423F3E70}"/>
+              </a:ext>
+            </a:extLst>
+          </p:cNvPr>
+          <p:cNvSpPr>
+            <a:spLocks noGrp="1"/>
+          </p:cNvSpPr>
+          <p:nvPr>
+            <p:ph type="title"/>
+          </p:nvPr>
+        </p:nvSpPr>
+        <p:spPr>
+          <a:xfrm>
+            <a:off x="1000979" y="740808"/>
+            <a:ext cx="10419907" cy="5082362"/>
+          </a:xfrm>
+        </p:spPr>
+        <p:txBody>
+          <a:bodyPr>
+            <a:normAutofit/>
+          </a:bodyPr>
+          <a:lstStyle/>
+          <a:p>
+            <a:pPr>
+              <a:lnSpc>
+                <a:spcPct val="150000"/>
+              </a:lnSpc>
+            </a:pPr>
+            <a:r>
+              <a:rPr lang="zh-TW" altLang="en-US" sz="9600" dirty="0">
+                <a:solidFill>
+                  <a:schemeClr val="tx1"/>
+                </a:solidFill>
+                <a:latin typeface="微軟正黑體" panose="020B0604030504040204" pitchFamily="34" charset="-120"/>
+                <a:ea typeface="微軟正黑體" panose="020B0604030504040204" pitchFamily="34" charset="-120"/>
+              </a:rPr>
+              <a:t>變數改為</a:t>
+            </a:r>
+            <a:r>
+              <a:rPr lang="zh-TW" altLang="en-US" sz="9600" dirty="0">
+                <a:solidFill>
+                  <a:srgbClr val="FF0000"/>
+                </a:solidFill>
+                <a:latin typeface="微軟正黑體" panose="020B0604030504040204" pitchFamily="34" charset="-120"/>
+                <a:ea typeface="微軟正黑體" panose="020B0604030504040204" pitchFamily="34" charset="-120"/>
+              </a:rPr>
+              <a:t>地球</a:t>
+            </a:r>
+            <a:br>
+              <a:rPr lang="en-US" altLang="zh-TW" sz="9600" dirty="0">
+                <a:solidFill>
+                  <a:srgbClr val="FF0000"/>
+                </a:solidFill>
+                <a:latin typeface="微軟正黑體" panose="020B0604030504040204" pitchFamily="34" charset="-120"/>
+                <a:ea typeface="微軟正黑體" panose="020B0604030504040204" pitchFamily="34" charset="-120"/>
+              </a:rPr>
+            </a:br>
+            <a:r>
+              <a:rPr lang="zh-TW" altLang="en-US" sz="9600" dirty="0">
+                <a:solidFill>
+                  <a:schemeClr val="tx1"/>
+                </a:solidFill>
+                <a:latin typeface="微軟正黑體" panose="020B0604030504040204" pitchFamily="34" charset="-120"/>
+                <a:ea typeface="微軟正黑體" panose="020B0604030504040204" pitchFamily="34" charset="-120"/>
+              </a:rPr>
+              <a:t>並加進</a:t>
+            </a:r>
+            <a:r>
+              <a:rPr lang="zh-TW" altLang="en-US" sz="9600" dirty="0">
+                <a:solidFill>
+                  <a:srgbClr val="FF0000"/>
+                </a:solidFill>
+                <a:latin typeface="微軟正黑體" panose="020B0604030504040204" pitchFamily="34" charset="-120"/>
+                <a:ea typeface="微軟正黑體" panose="020B0604030504040204" pitchFamily="34" charset="-120"/>
+              </a:rPr>
+              <a:t>變數清單</a:t>
+            </a:r>
+          </a:p>
+        </p:txBody>
+      </p:sp>
+    </p:spTree>
+    <p:extLst>
+      <p:ext uri="{BB962C8B-B14F-4D97-AF65-F5344CB8AC3E}">
+        <p14:creationId xmlns:p14="http://schemas.microsoft.com/office/powerpoint/2010/main" val="2329185642"/>
+      </p:ext>
+    </p:extLst>
+  </p:cSld>
+  <p:clrMapOvr>
+    <a:masterClrMapping/>
+  </p:clrMapOvr>
+  <p:timing>
+    <p:tnLst>
+      <p:par>
+        <p:cTn id="1" dur="indefinite" restart="never" nodeType="tmRoot">
+          <p:childTnLst>
+            <p:seq concurrent="1" nextAc="seek">
+              <p:cTn id="2" dur="indefinite" nodeType="mainSeq">
+                <p:childTnLst>
+                  <p:par>
+                    <p:cTn id="3" fill="hold">
+                      <p:stCondLst>
+                        <p:cond delay="indefinite"/>
+                        <p:cond evt="onBegin" delay="0">
+                          <p:tn val="2"/>
+                        </p:cond>
+                      </p:stCondLst>
+                      <p:childTnLst>
+                        <p:par>
+                          <p:cTn id="4" fill="hold">
+                            <p:stCondLst>
+                              <p:cond delay="0"/>
+                            </p:stCondLst>
+                            <p:childTnLst>
+                              <p:par>
+                                <p:cTn id="5" presetID="22" presetClass="entr" presetSubtype="4" fill="hold" grpId="0" nodeType="afterEffect">
+                                  <p:stCondLst>
+                                    <p:cond delay="0"/>
+                                  </p:stCondLst>
+                                  <p:iterate type="lt">
+                                    <p:tmPct val="100000"/>
+                                  </p:iterate>
+                                  <p:childTnLst>
+                                    <p:set>
+                                      <p:cBhvr>
+                                        <p:cTn id="6" dur="1" fill="hold">
+                                          <p:stCondLst>
+                                            <p:cond delay="0"/>
+                                          </p:stCondLst>
+                                        </p:cTn>
+                                        <p:tgtEl>
+                                          <p:spTgt spid="2"/>
+                                        </p:tgtEl>
+                                        <p:attrNameLst>
+                                          <p:attrName>style.visibility</p:attrName>
+                                        </p:attrNameLst>
+                                      </p:cBhvr>
+                                      <p:to>
+                                        <p:strVal val="visible"/>
+                                      </p:to>
+                                    </p:set>
+                                    <p:animEffect transition="in" filter="wipe(down)">
+                                      <p:cBhvr>
+                                        <p:cTn id="7" dur="250"/>
+                                        <p:tgtEl>
+                                          <p:spTgt spid="2"/>
+                                        </p:tgtEl>
+                                      </p:cBhvr>
+                                    </p:animEffect>
+                                  </p:childTnLst>
+                                </p:cTn>
+                              </p:par>
+                            </p:childTnLst>
+                          </p:cTn>
+                        </p:par>
+                      </p:childTnLst>
+                    </p:cTn>
+                  </p:par>
+                </p:childTnLst>
+              </p:cTn>
+              <p:prevCondLst>
+                <p:cond evt="onPrev" delay="0">
+                  <p:tgtEl>
+                    <p:sldTgt/>
+                  </p:tgtEl>
+                </p:cond>
+              </p:prevCondLst>
+              <p:nextCondLst>
+                <p:cond evt="onNext" delay="0">
+                  <p:tgtEl>
+                    <p:sldTgt/>
+                  </p:tgtEl>
+                </p:cond>
+              </p:nextCondLst>
+            </p:seq>
+          </p:childTnLst>
+        </p:cTn>
+      </p:par>
+    </p:tnLst>
+    <p:bldLst>
+      <p:bldP spid="2" grpId="0"/>
+    </p:bldLst>
+  </p:timing>
+</p:sld>
+</file>
+
+<file path=ppt/slides/slide7.xml><?xml version="1.0" encoding="utf-8"?>
+<p:sld xmlns:a="http://schemas.openxmlformats.org/drawingml/2006/main" xmlns:r="http://schemas.openxmlformats.org/officeDocument/2006/relationships" xmlns:p="http://schemas.openxmlformats.org/presentationml/2006/main">
+  <p:cSld>
+    <p:spTree>
+      <p:nvGrpSpPr>
+        <p:cNvPr id="1" name=""/>
+        <p:cNvGrpSpPr/>
+        <p:nvPr/>
+      </p:nvGrpSpPr>
+      <p:grpSpPr>
+        <a:xfrm>
+          <a:off x="0" y="0"/>
+          <a:ext cx="0" cy="0"/>
+          <a:chOff x="0" y="0"/>
+          <a:chExt cx="0" cy="0"/>
+        </a:xfrm>
+      </p:grpSpPr>
+      <p:sp>
+        <p:nvSpPr>
+          <p:cNvPr id="2" name="標題 1">
+            <a:extLst>
+              <a:ext uri="{FF2B5EF4-FFF2-40B4-BE49-F238E27FC236}">
+                <a16:creationId xmlns:a16="http://schemas.microsoft.com/office/drawing/2014/main" id="{60856E43-3621-4F02-B0E9-EF43423F3E70}"/>
+              </a:ext>
+            </a:extLst>
+          </p:cNvPr>
+          <p:cNvSpPr>
+            <a:spLocks noGrp="1"/>
+          </p:cNvSpPr>
+          <p:nvPr>
+            <p:ph type="title"/>
+          </p:nvPr>
+        </p:nvSpPr>
+        <p:spPr>
+          <a:xfrm>
+            <a:off x="1000979" y="740808"/>
+            <a:ext cx="10419907" cy="5082362"/>
+          </a:xfrm>
+        </p:spPr>
+        <p:txBody>
+          <a:bodyPr>
+            <a:normAutofit/>
+          </a:bodyPr>
+          <a:lstStyle/>
+          <a:p>
+            <a:pPr>
+              <a:lnSpc>
+                <a:spcPct val="150000"/>
+              </a:lnSpc>
+            </a:pPr>
+            <a:r>
+              <a:rPr lang="zh-TW" altLang="en-US" sz="9600" dirty="0">
+                <a:solidFill>
+                  <a:schemeClr val="tx1"/>
+                </a:solidFill>
+                <a:latin typeface="微軟正黑體" panose="020B0604030504040204" pitchFamily="34" charset="-120"/>
+                <a:ea typeface="微軟正黑體" panose="020B0604030504040204" pitchFamily="34" charset="-120"/>
+              </a:rPr>
+              <a:t>匯入 </a:t>
+            </a:r>
+            <a:r>
+              <a:rPr lang="zh-TW" altLang="en-US" sz="9600" dirty="0">
+                <a:solidFill>
+                  <a:srgbClr val="FF0000"/>
+                </a:solidFill>
+                <a:latin typeface="微軟正黑體" panose="020B0604030504040204" pitchFamily="34" charset="-120"/>
+                <a:ea typeface="微軟正黑體" panose="020B0604030504040204" pitchFamily="34" charset="-120"/>
+              </a:rPr>
+              <a:t>地球材質</a:t>
+            </a:r>
+            <a:br>
+              <a:rPr lang="en-US" altLang="zh-TW" sz="9600" dirty="0">
+                <a:solidFill>
+                  <a:schemeClr val="tx1"/>
+                </a:solidFill>
+                <a:latin typeface="微軟正黑體" panose="020B0604030504040204" pitchFamily="34" charset="-120"/>
+                <a:ea typeface="微軟正黑體" panose="020B0604030504040204" pitchFamily="34" charset="-120"/>
+              </a:rPr>
+            </a:br>
+            <a:r>
+              <a:rPr lang="zh-TW" altLang="en-US" sz="9600" dirty="0">
+                <a:solidFill>
+                  <a:schemeClr val="tx1"/>
+                </a:solidFill>
+                <a:latin typeface="微軟正黑體" panose="020B0604030504040204" pitchFamily="34" charset="-120"/>
+                <a:ea typeface="微軟正黑體" panose="020B0604030504040204" pitchFamily="34" charset="-120"/>
+              </a:rPr>
+              <a:t>貼上</a:t>
+            </a:r>
+            <a:r>
+              <a:rPr lang="zh-TW" altLang="en-US" sz="9600" dirty="0">
+                <a:solidFill>
+                  <a:srgbClr val="FF0000"/>
+                </a:solidFill>
+                <a:latin typeface="微軟正黑體" panose="020B0604030504040204" pitchFamily="34" charset="-120"/>
+                <a:ea typeface="微軟正黑體" panose="020B0604030504040204" pitchFamily="34" charset="-120"/>
+              </a:rPr>
+              <a:t>材質檔名</a:t>
+            </a:r>
+          </a:p>
+        </p:txBody>
+      </p:sp>
+    </p:spTree>
+    <p:extLst>
+      <p:ext uri="{BB962C8B-B14F-4D97-AF65-F5344CB8AC3E}">
+        <p14:creationId xmlns:p14="http://schemas.microsoft.com/office/powerpoint/2010/main" val="1285919887"/>
+      </p:ext>
+    </p:extLst>
+  </p:cSld>
+  <p:clrMapOvr>
+    <a:masterClrMapping/>
+  </p:clrMapOvr>
+  <p:timing>
+    <p:tnLst>
+      <p:par>
+        <p:cTn id="1" dur="indefinite" restart="never" nodeType="tmRoot">
+          <p:childTnLst>
+            <p:seq concurrent="1" nextAc="seek">
+              <p:cTn id="2" dur="indefinite" nodeType="mainSeq">
+                <p:childTnLst>
+                  <p:par>
+                    <p:cTn id="3" fill="hold">
+                      <p:stCondLst>
+                        <p:cond delay="indefinite"/>
+                        <p:cond evt="onBegin" delay="0">
+                          <p:tn val="2"/>
+                        </p:cond>
+                      </p:stCondLst>
+                      <p:childTnLst>
+                        <p:par>
+                          <p:cTn id="4" fill="hold">
+                            <p:stCondLst>
+                              <p:cond delay="0"/>
+                            </p:stCondLst>
+                            <p:childTnLst>
+                              <p:par>
+                                <p:cTn id="5" presetID="22" presetClass="entr" presetSubtype="4" fill="hold" grpId="0" nodeType="afterEffect">
+                                  <p:stCondLst>
+                                    <p:cond delay="0"/>
+                                  </p:stCondLst>
+                                  <p:iterate type="lt">
+                                    <p:tmPct val="100000"/>
+                                  </p:iterate>
+                                  <p:childTnLst>
+                                    <p:set>
+                                      <p:cBhvr>
+                                        <p:cTn id="6" dur="1" fill="hold">
+                                          <p:stCondLst>
+                                            <p:cond delay="0"/>
+                                          </p:stCondLst>
+                                        </p:cTn>
+                                        <p:tgtEl>
+                                          <p:spTgt spid="2"/>
+                                        </p:tgtEl>
+                                        <p:attrNameLst>
+                                          <p:attrName>style.visibility</p:attrName>
+                                        </p:attrNameLst>
+                                      </p:cBhvr>
+                                      <p:to>
+                                        <p:strVal val="visible"/>
+                                      </p:to>
+                                    </p:set>
+                                    <p:animEffect transition="in" filter="wipe(down)">
+                                      <p:cBhvr>
+                                        <p:cTn id="7" dur="250"/>
+                                        <p:tgtEl>
+                                          <p:spTgt spid="2"/>
+                                        </p:tgtEl>
+                                      </p:cBhvr>
+                                    </p:animEffect>
+                                  </p:childTnLst>
+                                </p:cTn>
+                              </p:par>
+                            </p:childTnLst>
+                          </p:cTn>
+                        </p:par>
+                      </p:childTnLst>
+                    </p:cTn>
+                  </p:par>
+                </p:childTnLst>
+              </p:cTn>
+              <p:prevCondLst>
+                <p:cond evt="onPrev" delay="0">
+                  <p:tgtEl>
+                    <p:sldTgt/>
+                  </p:tgtEl>
+                </p:cond>
+              </p:prevCondLst>
+              <p:nextCondLst>
+                <p:cond evt="onNext" delay="0">
+                  <p:tgtEl>
+                    <p:sldTgt/>
+                  </p:tgtEl>
+                </p:cond>
+              </p:nextCondLst>
+            </p:seq>
+          </p:childTnLst>
+        </p:cTn>
+      </p:par>
+    </p:tnLst>
+    <p:bldLst>
+      <p:bldP spid="2" grpId="0"/>
+    </p:bldLst>
+  </p:timing>
+</p:sld>
+</file>
+
+<file path=ppt/slides/slide8.xml><?xml version="1.0" encoding="utf-8"?>
+<p:sld xmlns:a="http://schemas.openxmlformats.org/drawingml/2006/main" xmlns:r="http://schemas.openxmlformats.org/officeDocument/2006/relationships" xmlns:p="http://schemas.openxmlformats.org/presentationml/2006/main">
+  <p:cSld>
+    <p:spTree>
+      <p:nvGrpSpPr>
+        <p:cNvPr id="1" name=""/>
+        <p:cNvGrpSpPr/>
+        <p:nvPr/>
+      </p:nvGrpSpPr>
+      <p:grpSpPr>
+        <a:xfrm>
+          <a:off x="0" y="0"/>
+          <a:ext cx="0" cy="0"/>
+          <a:chOff x="0" y="0"/>
+          <a:chExt cx="0" cy="0"/>
+        </a:xfrm>
+      </p:grpSpPr>
+      <p:sp>
+        <p:nvSpPr>
+          <p:cNvPr id="2" name="標題 1">
+            <a:extLst>
+              <a:ext uri="{FF2B5EF4-FFF2-40B4-BE49-F238E27FC236}">
+                <a16:creationId xmlns:a16="http://schemas.microsoft.com/office/drawing/2014/main" id="{60856E43-3621-4F02-B0E9-EF43423F3E70}"/>
+              </a:ext>
+            </a:extLst>
+          </p:cNvPr>
+          <p:cNvSpPr>
+            <a:spLocks noGrp="1"/>
+          </p:cNvSpPr>
+          <p:nvPr>
+            <p:ph type="title"/>
+          </p:nvPr>
+        </p:nvSpPr>
+        <p:spPr>
+          <a:xfrm>
+            <a:off x="1000979" y="740808"/>
+            <a:ext cx="10419907" cy="5082362"/>
+          </a:xfrm>
+        </p:spPr>
+        <p:txBody>
+          <a:bodyPr>
+            <a:normAutofit/>
+          </a:bodyPr>
+          <a:lstStyle/>
+          <a:p>
+            <a:pPr>
+              <a:lnSpc>
+                <a:spcPct val="150000"/>
+              </a:lnSpc>
+            </a:pPr>
+            <a:r>
+              <a:rPr lang="zh-TW" altLang="en-US" sz="9600" dirty="0">
+                <a:solidFill>
+                  <a:schemeClr val="tx1"/>
+                </a:solidFill>
+                <a:latin typeface="微軟正黑體" panose="020B0604030504040204" pitchFamily="34" charset="-120"/>
+                <a:ea typeface="微軟正黑體" panose="020B0604030504040204" pitchFamily="34" charset="-120"/>
+              </a:rPr>
+              <a:t>將地球</a:t>
+            </a:r>
+            <a:r>
+              <a:rPr lang="zh-TW" altLang="en-US" sz="9600" dirty="0">
+                <a:solidFill>
+                  <a:srgbClr val="FF0000"/>
+                </a:solidFill>
+                <a:latin typeface="微軟正黑體" panose="020B0604030504040204" pitchFamily="34" charset="-120"/>
+                <a:ea typeface="微軟正黑體" panose="020B0604030504040204" pitchFamily="34" charset="-120"/>
+              </a:rPr>
+              <a:t>放大</a:t>
+            </a:r>
+            <a:r>
+              <a:rPr lang="en-US" altLang="zh-TW" sz="9600" dirty="0">
+                <a:solidFill>
+                  <a:srgbClr val="FF0000"/>
+                </a:solidFill>
+                <a:latin typeface="微軟正黑體" panose="020B0604030504040204" pitchFamily="34" charset="-120"/>
+                <a:ea typeface="微軟正黑體" panose="020B0604030504040204" pitchFamily="34" charset="-120"/>
+              </a:rPr>
+              <a:t>5</a:t>
+            </a:r>
+            <a:r>
+              <a:rPr lang="zh-TW" altLang="en-US" sz="9600" dirty="0">
+                <a:solidFill>
+                  <a:srgbClr val="FF0000"/>
+                </a:solidFill>
+                <a:latin typeface="微軟正黑體" panose="020B0604030504040204" pitchFamily="34" charset="-120"/>
+                <a:ea typeface="微軟正黑體" panose="020B0604030504040204" pitchFamily="34" charset="-120"/>
+              </a:rPr>
+              <a:t>倍</a:t>
+            </a:r>
+          </a:p>
+        </p:txBody>
+      </p:sp>
+    </p:spTree>
+    <p:extLst>
+      <p:ext uri="{BB962C8B-B14F-4D97-AF65-F5344CB8AC3E}">
+        <p14:creationId xmlns:p14="http://schemas.microsoft.com/office/powerpoint/2010/main" val="1003423303"/>
+      </p:ext>
+    </p:extLst>
+  </p:cSld>
+  <p:clrMapOvr>
+    <a:masterClrMapping/>
+  </p:clrMapOvr>
+  <p:timing>
+    <p:tnLst>
+      <p:par>
+        <p:cTn id="1" dur="indefinite" restart="never" nodeType="tmRoot">
+          <p:childTnLst>
+            <p:seq concurrent="1" nextAc="seek">
+              <p:cTn id="2" dur="indefinite" nodeType="mainSeq">
+                <p:childTnLst>
+                  <p:par>
+                    <p:cTn id="3" fill="hold">
+                      <p:stCondLst>
+                        <p:cond delay="indefinite"/>
+                        <p:cond evt="onBegin" delay="0">
+                          <p:tn val="2"/>
+                        </p:cond>
+                      </p:stCondLst>
+                      <p:childTnLst>
+                        <p:par>
+                          <p:cTn id="4" fill="hold">
+                            <p:stCondLst>
+                              <p:cond delay="0"/>
+                            </p:stCondLst>
+                            <p:childTnLst>
+                              <p:par>
+                                <p:cTn id="5" presetID="22" presetClass="entr" presetSubtype="4" fill="hold" grpId="0" nodeType="afterEffect">
+                                  <p:stCondLst>
+                                    <p:cond delay="0"/>
+                                  </p:stCondLst>
+                                  <p:iterate type="lt">
+                                    <p:tmPct val="100000"/>
+                                  </p:iterate>
+                                  <p:childTnLst>
+                                    <p:set>
+                                      <p:cBhvr>
+                                        <p:cTn id="6" dur="1" fill="hold">
+                                          <p:stCondLst>
+                                            <p:cond delay="0"/>
+                                          </p:stCondLst>
+                                        </p:cTn>
+                                        <p:tgtEl>
+                                          <p:spTgt spid="2"/>
+                                        </p:tgtEl>
+                                        <p:attrNameLst>
+                                          <p:attrName>style.visibility</p:attrName>
+                                        </p:attrNameLst>
+                                      </p:cBhvr>
+                                      <p:to>
+                                        <p:strVal val="visible"/>
+                                      </p:to>
+                                    </p:set>
+                                    <p:animEffect transition="in" filter="wipe(down)">
+                                      <p:cBhvr>
+                                        <p:cTn id="7" dur="250"/>
+                                        <p:tgtEl>
+                                          <p:spTgt spid="2"/>
+                                        </p:tgtEl>
+                                      </p:cBhvr>
+                                    </p:animEffect>
+                                  </p:childTnLst>
+                                </p:cTn>
+                              </p:par>
+                            </p:childTnLst>
+                          </p:cTn>
+                        </p:par>
+                      </p:childTnLst>
+                    </p:cTn>
+                  </p:par>
+                </p:childTnLst>
+              </p:cTn>
+              <p:prevCondLst>
+                <p:cond evt="onPrev" delay="0">
+                  <p:tgtEl>
+                    <p:sldTgt/>
+                  </p:tgtEl>
+                </p:cond>
+              </p:prevCondLst>
+              <p:nextCondLst>
+                <p:cond evt="onNext" delay="0">
+                  <p:tgtEl>
+                    <p:sldTgt/>
+                  </p:tgtEl>
+                </p:cond>
+              </p:nextCondLst>
+            </p:seq>
+          </p:childTnLst>
+        </p:cTn>
+      </p:par>
+    </p:tnLst>
+    <p:bldLst>
+      <p:bldP spid="2" grpId="0"/>
+    </p:bldLst>
+  </p:timing>
+</p:sld>
+</file>
+
+<file path=ppt/slides/slide9.xml><?xml version="1.0" encoding="utf-8"?>
+<p:sld xmlns:a="http://schemas.openxmlformats.org/drawingml/2006/main" xmlns:r="http://schemas.openxmlformats.org/officeDocument/2006/relationships" xmlns:p="http://schemas.openxmlformats.org/presentationml/2006/main">
+  <p:cSld>
+    <p:spTree>
+      <p:nvGrpSpPr>
+        <p:cNvPr id="1" name=""/>
+        <p:cNvGrpSpPr/>
+        <p:nvPr/>
+      </p:nvGrpSpPr>
+      <p:grpSpPr>
+        <a:xfrm>
+          <a:off x="0" y="0"/>
+          <a:ext cx="0" cy="0"/>
+          <a:chOff x="0" y="0"/>
+          <a:chExt cx="0" cy="0"/>
+        </a:xfrm>
+      </p:grpSpPr>
+      <p:sp>
+        <p:nvSpPr>
+          <p:cNvPr id="4" name="標題 1">
+            <a:extLst>
+              <a:ext uri="{FF2B5EF4-FFF2-40B4-BE49-F238E27FC236}">
+                <a16:creationId xmlns:a16="http://schemas.microsoft.com/office/drawing/2014/main" id="{9EADEA97-424F-499B-A6C4-A6DCEE800E72}"/>
+              </a:ext>
+            </a:extLst>
+          </p:cNvPr>
+          <p:cNvSpPr txBox="1">
+            <a:spLocks/>
+          </p:cNvSpPr>
+          <p:nvPr/>
+        </p:nvSpPr>
+        <p:spPr>
+          <a:xfrm>
+            <a:off x="2762810" y="2671233"/>
+            <a:ext cx="6815669" cy="1515533"/>
+          </a:xfrm>
+          <a:prstGeom prst="rect">
+            <a:avLst/>
+          </a:prstGeom>
+          <a:effectLst/>
+        </p:spPr>
+        <p:txBody>
+          <a:bodyPr vert="horz" lIns="91440" tIns="45720" rIns="91440" bIns="45720" rtlCol="0" anchor="b">
+            <a:noAutofit/>
+          </a:bodyPr>
+          <a:lstStyle>
+            <a:lvl1pPr algn="ctr" defTabSz="457200" rtl="0" eaLnBrk="1" latinLnBrk="0" hangingPunct="1">
+              <a:spcBef>
+                <a:spcPct val="0"/>
+              </a:spcBef>
+              <a:buNone/>
+              <a:defRPr sz="5400" kern="1200" cap="none">
+                <a:ln w="3175" cmpd="sng">
+                  <a:noFill/>
+                </a:ln>
+                <a:solidFill>
+                  <a:schemeClr val="tx1">
+                    <a:lumMod val="85000"/>
+                    <a:lumOff val="15000"/>
+                  </a:schemeClr>
+                </a:solidFill>
+                <a:effectLst/>
+                <a:latin typeface="+mj-lt"/>
+                <a:ea typeface="+mj-ea"/>
+                <a:cs typeface="+mj-cs"/>
+              </a:defRPr>
+            </a:lvl1pPr>
+            <a:lvl2pPr eaLnBrk="1" hangingPunct="1">
+              <a:defRPr>
+                <a:solidFill>
+                  <a:schemeClr val="tx2"/>
+                </a:solidFill>
+              </a:defRPr>
+            </a:lvl2pPr>
+            <a:lvl3pPr eaLnBrk="1" hangingPunct="1">
+              <a:defRPr>
+                <a:solidFill>
+                  <a:schemeClr val="tx2"/>
+                </a:solidFill>
+              </a:defRPr>
+            </a:lvl3pPr>
+            <a:lvl4pPr eaLnBrk="1" hangingPunct="1">
+              <a:defRPr>
+                <a:solidFill>
+                  <a:schemeClr val="tx2"/>
+                </a:solidFill>
+              </a:defRPr>
+            </a:lvl4pPr>
+            <a:lvl5pPr eaLnBrk="1" hangingPunct="1">
+              <a:defRPr>
+                <a:solidFill>
+                  <a:schemeClr val="tx2"/>
+                </a:solidFill>
+              </a:defRPr>
+            </a:lvl5pPr>
+            <a:lvl6pPr eaLnBrk="1" hangingPunct="1">
+              <a:defRPr>
+                <a:solidFill>
+                  <a:schemeClr val="tx2"/>
+                </a:solidFill>
+              </a:defRPr>
+            </a:lvl6pPr>
+            <a:lvl7pPr eaLnBrk="1" hangingPunct="1">
+              <a:defRPr>
+                <a:solidFill>
+                  <a:schemeClr val="tx2"/>
+                </a:solidFill>
+              </a:defRPr>
+            </a:lvl7pPr>
+            <a:lvl8pPr eaLnBrk="1" hangingPunct="1">
+              <a:defRPr>
+                <a:solidFill>
+                  <a:schemeClr val="tx2"/>
+                </a:solidFill>
+              </a:defRPr>
+            </a:lvl8pPr>
+            <a:lvl9pPr eaLnBrk="1" hangingPunct="1">
+              <a:defRPr>
+                <a:solidFill>
+                  <a:schemeClr val="tx2"/>
+                </a:solidFill>
+              </a:defRPr>
+            </a:lvl9pPr>
+          </a:lstStyle>
+          <a:p>
+            <a:r>
+              <a:rPr lang="zh-TW" altLang="en-US" sz="8000" dirty="0">
+                <a:latin typeface="Berlin Sans FB" panose="020E0602020502020306" pitchFamily="34" charset="0"/>
+                <a:ea typeface="微軟正黑體 Light" panose="020B0304030504040204" pitchFamily="34" charset="-120"/>
+              </a:rPr>
+              <a:t>標示自轉方向</a:t>
+            </a:r>
+          </a:p>
+        </p:txBody>
+      </p:sp>
+    </p:spTree>
+    <p:extLst>
+      <p:ext uri="{BB962C8B-B14F-4D97-AF65-F5344CB8AC3E}">
+        <p14:creationId xmlns:p14="http://schemas.microsoft.com/office/powerpoint/2010/main" val="1811370539"/>
+      </p:ext>
+    </p:extLst>
+  </p:cSld>
+  <p:clrMapOvr>
+    <a:masterClrMapping/>
+  </p:clrMapOvr>
 </p:sld>
 </file>
 

</xml_diff>